<commit_message>
Update param instruction in README.md
</commit_message>
<xml_diff>
--- a/illustration2.pptx
+++ b/illustration2.pptx
@@ -2,18 +2,21 @@
 <file path=ppt/presentation.xml><?xml version="1.0" encoding="utf-8"?>
 <p:presentation xmlns:a="http://schemas.openxmlformats.org/drawingml/2006/main" xmlns:r="http://schemas.openxmlformats.org/officeDocument/2006/relationships" xmlns:p="http://schemas.openxmlformats.org/presentationml/2006/main" saveSubsetFonts="1">
   <p:sldMasterIdLst>
-    <p:sldMasterId id="2147483648" r:id="rId1"/>
+    <p:sldMasterId id="2147483672" r:id="rId1"/>
   </p:sldMasterIdLst>
   <p:sldIdLst>
     <p:sldId id="256" r:id="rId2"/>
+    <p:sldId id="257" r:id="rId3"/>
+    <p:sldId id="258" r:id="rId4"/>
+    <p:sldId id="259" r:id="rId5"/>
   </p:sldIdLst>
-  <p:sldSz cx="12192000" cy="6858000"/>
+  <p:sldSz cx="10799763" cy="3600450"/>
   <p:notesSz cx="6858000" cy="9144000"/>
   <p:defaultTextStyle>
     <a:defPPr>
-      <a:defRPr lang="zh-CN"/>
+      <a:defRPr lang="en-US"/>
     </a:defPPr>
-    <a:lvl1pPr marL="0" algn="l" defTabSz="914400" rtl="0" eaLnBrk="1" latinLnBrk="0" hangingPunct="1">
+    <a:lvl1pPr marL="0" algn="l" defTabSz="457200" rtl="0" eaLnBrk="1" latinLnBrk="0" hangingPunct="1">
       <a:defRPr sz="1800" kern="1200">
         <a:solidFill>
           <a:schemeClr val="tx1"/>
@@ -23,7 +26,7 @@
         <a:cs typeface="+mn-cs"/>
       </a:defRPr>
     </a:lvl1pPr>
-    <a:lvl2pPr marL="457200" algn="l" defTabSz="914400" rtl="0" eaLnBrk="1" latinLnBrk="0" hangingPunct="1">
+    <a:lvl2pPr marL="457200" algn="l" defTabSz="457200" rtl="0" eaLnBrk="1" latinLnBrk="0" hangingPunct="1">
       <a:defRPr sz="1800" kern="1200">
         <a:solidFill>
           <a:schemeClr val="tx1"/>
@@ -33,7 +36,7 @@
         <a:cs typeface="+mn-cs"/>
       </a:defRPr>
     </a:lvl2pPr>
-    <a:lvl3pPr marL="914400" algn="l" defTabSz="914400" rtl="0" eaLnBrk="1" latinLnBrk="0" hangingPunct="1">
+    <a:lvl3pPr marL="914400" algn="l" defTabSz="457200" rtl="0" eaLnBrk="1" latinLnBrk="0" hangingPunct="1">
       <a:defRPr sz="1800" kern="1200">
         <a:solidFill>
           <a:schemeClr val="tx1"/>
@@ -43,7 +46,7 @@
         <a:cs typeface="+mn-cs"/>
       </a:defRPr>
     </a:lvl3pPr>
-    <a:lvl4pPr marL="1371600" algn="l" defTabSz="914400" rtl="0" eaLnBrk="1" latinLnBrk="0" hangingPunct="1">
+    <a:lvl4pPr marL="1371600" algn="l" defTabSz="457200" rtl="0" eaLnBrk="1" latinLnBrk="0" hangingPunct="1">
       <a:defRPr sz="1800" kern="1200">
         <a:solidFill>
           <a:schemeClr val="tx1"/>
@@ -53,7 +56,7 @@
         <a:cs typeface="+mn-cs"/>
       </a:defRPr>
     </a:lvl4pPr>
-    <a:lvl5pPr marL="1828800" algn="l" defTabSz="914400" rtl="0" eaLnBrk="1" latinLnBrk="0" hangingPunct="1">
+    <a:lvl5pPr marL="1828800" algn="l" defTabSz="457200" rtl="0" eaLnBrk="1" latinLnBrk="0" hangingPunct="1">
       <a:defRPr sz="1800" kern="1200">
         <a:solidFill>
           <a:schemeClr val="tx1"/>
@@ -63,7 +66,7 @@
         <a:cs typeface="+mn-cs"/>
       </a:defRPr>
     </a:lvl5pPr>
-    <a:lvl6pPr marL="2286000" algn="l" defTabSz="914400" rtl="0" eaLnBrk="1" latinLnBrk="0" hangingPunct="1">
+    <a:lvl6pPr marL="2286000" algn="l" defTabSz="457200" rtl="0" eaLnBrk="1" latinLnBrk="0" hangingPunct="1">
       <a:defRPr sz="1800" kern="1200">
         <a:solidFill>
           <a:schemeClr val="tx1"/>
@@ -73,7 +76,7 @@
         <a:cs typeface="+mn-cs"/>
       </a:defRPr>
     </a:lvl6pPr>
-    <a:lvl7pPr marL="2743200" algn="l" defTabSz="914400" rtl="0" eaLnBrk="1" latinLnBrk="0" hangingPunct="1">
+    <a:lvl7pPr marL="2743200" algn="l" defTabSz="457200" rtl="0" eaLnBrk="1" latinLnBrk="0" hangingPunct="1">
       <a:defRPr sz="1800" kern="1200">
         <a:solidFill>
           <a:schemeClr val="tx1"/>
@@ -83,7 +86,7 @@
         <a:cs typeface="+mn-cs"/>
       </a:defRPr>
     </a:lvl7pPr>
-    <a:lvl8pPr marL="3200400" algn="l" defTabSz="914400" rtl="0" eaLnBrk="1" latinLnBrk="0" hangingPunct="1">
+    <a:lvl8pPr marL="3200400" algn="l" defTabSz="457200" rtl="0" eaLnBrk="1" latinLnBrk="0" hangingPunct="1">
       <a:defRPr sz="1800" kern="1200">
         <a:solidFill>
           <a:schemeClr val="tx1"/>
@@ -93,7 +96,7 @@
         <a:cs typeface="+mn-cs"/>
       </a:defRPr>
     </a:lvl8pPr>
-    <a:lvl9pPr marL="3657600" algn="l" defTabSz="914400" rtl="0" eaLnBrk="1" latinLnBrk="0" hangingPunct="1">
+    <a:lvl9pPr marL="3657600" algn="l" defTabSz="457200" rtl="0" eaLnBrk="1" latinLnBrk="0" hangingPunct="1">
       <a:defRPr sz="1800" kern="1200">
         <a:solidFill>
           <a:schemeClr val="tx1"/>
@@ -107,12 +110,12 @@
   <p:extLst>
     <p:ext uri="{EFAFB233-063F-42B5-8137-9DF3F51BA10A}">
       <p15:sldGuideLst xmlns:p15="http://schemas.microsoft.com/office/powerpoint/2012/main">
-        <p15:guide id="1" orient="horz" pos="2160" userDrawn="1">
+        <p15:guide id="1" orient="horz" pos="1134" userDrawn="1">
           <p15:clr>
             <a:srgbClr val="A4A3A4"/>
           </p15:clr>
         </p15:guide>
-        <p15:guide id="2" pos="3840" userDrawn="1">
+        <p15:guide id="2" pos="3402" userDrawn="1">
           <p15:clr>
             <a:srgbClr val="A4A3A4"/>
           </p15:clr>
@@ -142,13 +145,7 @@
       </p:grpSpPr>
       <p:sp>
         <p:nvSpPr>
-          <p:cNvPr id="2" name="标题 1">
-            <a:extLst>
-              <a:ext uri="{FF2B5EF4-FFF2-40B4-BE49-F238E27FC236}">
-                <a16:creationId xmlns:a16="http://schemas.microsoft.com/office/drawing/2014/main" id="{35711AC3-3817-FB61-F195-326F2A5700B2}"/>
-              </a:ext>
-            </a:extLst>
-          </p:cNvPr>
+          <p:cNvPr id="2" name="Title 1"/>
           <p:cNvSpPr>
             <a:spLocks noGrp="1"/>
           </p:cNvSpPr>
@@ -158,15 +155,15 @@
         </p:nvSpPr>
         <p:spPr>
           <a:xfrm>
-            <a:off x="1524000" y="1122363"/>
-            <a:ext cx="9144000" cy="2387600"/>
+            <a:off x="1349971" y="589241"/>
+            <a:ext cx="8099822" cy="1253490"/>
           </a:xfrm>
         </p:spPr>
         <p:txBody>
           <a:bodyPr anchor="b"/>
           <a:lstStyle>
             <a:lvl1pPr algn="ctr">
-              <a:defRPr sz="6000"/>
+              <a:defRPr sz="3150"/>
             </a:lvl1pPr>
           </a:lstStyle>
           <a:p>
@@ -174,19 +171,13 @@
               <a:rPr lang="zh-CN" altLang="en-US"/>
               <a:t>单击此处编辑母版标题样式</a:t>
             </a:r>
-            <a:endParaRPr lang="en-GB"/>
-          </a:p>
-        </p:txBody>
-      </p:sp>
-      <p:sp>
-        <p:nvSpPr>
-          <p:cNvPr id="3" name="副标题 2">
-            <a:extLst>
-              <a:ext uri="{FF2B5EF4-FFF2-40B4-BE49-F238E27FC236}">
-                <a16:creationId xmlns:a16="http://schemas.microsoft.com/office/drawing/2014/main" id="{1181CCDC-1EB7-C824-DB74-90CA4A0518D1}"/>
-              </a:ext>
-            </a:extLst>
-          </p:cNvPr>
+            <a:endParaRPr lang="en-US" dirty="0"/>
+          </a:p>
+        </p:txBody>
+      </p:sp>
+      <p:sp>
+        <p:nvSpPr>
+          <p:cNvPr id="3" name="Subtitle 2"/>
           <p:cNvSpPr>
             <a:spLocks noGrp="1"/>
           </p:cNvSpPr>
@@ -196,8 +187,8 @@
         </p:nvSpPr>
         <p:spPr>
           <a:xfrm>
-            <a:off x="1524000" y="3602038"/>
-            <a:ext cx="9144000" cy="1655762"/>
+            <a:off x="1349971" y="1891070"/>
+            <a:ext cx="8099822" cy="869275"/>
           </a:xfrm>
         </p:spPr>
         <p:txBody>
@@ -205,39 +196,39 @@
           <a:lstStyle>
             <a:lvl1pPr marL="0" indent="0" algn="ctr">
               <a:buNone/>
-              <a:defRPr sz="2400"/>
+              <a:defRPr sz="1260"/>
             </a:lvl1pPr>
-            <a:lvl2pPr marL="457200" indent="0" algn="ctr">
-              <a:buNone/>
-              <a:defRPr sz="2000"/>
+            <a:lvl2pPr marL="240030" indent="0" algn="ctr">
+              <a:buNone/>
+              <a:defRPr sz="1050"/>
             </a:lvl2pPr>
-            <a:lvl3pPr marL="914400" indent="0" algn="ctr">
-              <a:buNone/>
-              <a:defRPr sz="1800"/>
+            <a:lvl3pPr marL="480060" indent="0" algn="ctr">
+              <a:buNone/>
+              <a:defRPr sz="945"/>
             </a:lvl3pPr>
-            <a:lvl4pPr marL="1371600" indent="0" algn="ctr">
-              <a:buNone/>
-              <a:defRPr sz="1600"/>
+            <a:lvl4pPr marL="720090" indent="0" algn="ctr">
+              <a:buNone/>
+              <a:defRPr sz="840"/>
             </a:lvl4pPr>
-            <a:lvl5pPr marL="1828800" indent="0" algn="ctr">
-              <a:buNone/>
-              <a:defRPr sz="1600"/>
+            <a:lvl5pPr marL="960120" indent="0" algn="ctr">
+              <a:buNone/>
+              <a:defRPr sz="840"/>
             </a:lvl5pPr>
-            <a:lvl6pPr marL="2286000" indent="0" algn="ctr">
-              <a:buNone/>
-              <a:defRPr sz="1600"/>
+            <a:lvl6pPr marL="1200150" indent="0" algn="ctr">
+              <a:buNone/>
+              <a:defRPr sz="840"/>
             </a:lvl6pPr>
-            <a:lvl7pPr marL="2743200" indent="0" algn="ctr">
-              <a:buNone/>
-              <a:defRPr sz="1600"/>
+            <a:lvl7pPr marL="1440180" indent="0" algn="ctr">
+              <a:buNone/>
+              <a:defRPr sz="840"/>
             </a:lvl7pPr>
-            <a:lvl8pPr marL="3200400" indent="0" algn="ctr">
-              <a:buNone/>
-              <a:defRPr sz="1600"/>
+            <a:lvl8pPr marL="1680210" indent="0" algn="ctr">
+              <a:buNone/>
+              <a:defRPr sz="840"/>
             </a:lvl8pPr>
-            <a:lvl9pPr marL="3657600" indent="0" algn="ctr">
-              <a:buNone/>
-              <a:defRPr sz="1600"/>
+            <a:lvl9pPr marL="1920240" indent="0" algn="ctr">
+              <a:buNone/>
+              <a:defRPr sz="840"/>
             </a:lvl9pPr>
           </a:lstStyle>
           <a:p>
@@ -245,19 +236,13 @@
               <a:rPr lang="zh-CN" altLang="en-US"/>
               <a:t>单击此处编辑母版副标题样式</a:t>
             </a:r>
-            <a:endParaRPr lang="en-GB"/>
-          </a:p>
-        </p:txBody>
-      </p:sp>
-      <p:sp>
-        <p:nvSpPr>
-          <p:cNvPr id="4" name="日期占位符 3">
-            <a:extLst>
-              <a:ext uri="{FF2B5EF4-FFF2-40B4-BE49-F238E27FC236}">
-                <a16:creationId xmlns:a16="http://schemas.microsoft.com/office/drawing/2014/main" id="{ADB9C18D-B4A8-C481-5148-DC7E904D72CA}"/>
-              </a:ext>
-            </a:extLst>
-          </p:cNvPr>
+            <a:endParaRPr lang="en-US" dirty="0"/>
+          </a:p>
+        </p:txBody>
+      </p:sp>
+      <p:sp>
+        <p:nvSpPr>
+          <p:cNvPr id="4" name="Date Placeholder 3"/>
           <p:cNvSpPr>
             <a:spLocks noGrp="1"/>
           </p:cNvSpPr>
@@ -280,13 +265,7 @@
       </p:sp>
       <p:sp>
         <p:nvSpPr>
-          <p:cNvPr id="5" name="页脚占位符 4">
-            <a:extLst>
-              <a:ext uri="{FF2B5EF4-FFF2-40B4-BE49-F238E27FC236}">
-                <a16:creationId xmlns:a16="http://schemas.microsoft.com/office/drawing/2014/main" id="{CAC95CC6-5290-EB9D-44AA-45995C71BEA1}"/>
-              </a:ext>
-            </a:extLst>
-          </p:cNvPr>
+          <p:cNvPr id="5" name="Footer Placeholder 4"/>
           <p:cNvSpPr>
             <a:spLocks noGrp="1"/>
           </p:cNvSpPr>
@@ -305,13 +284,7 @@
       </p:sp>
       <p:sp>
         <p:nvSpPr>
-          <p:cNvPr id="6" name="灯片编号占位符 5">
-            <a:extLst>
-              <a:ext uri="{FF2B5EF4-FFF2-40B4-BE49-F238E27FC236}">
-                <a16:creationId xmlns:a16="http://schemas.microsoft.com/office/drawing/2014/main" id="{772B2497-90BD-9F24-E07E-A38B38309986}"/>
-              </a:ext>
-            </a:extLst>
-          </p:cNvPr>
+          <p:cNvPr id="6" name="Slide Number Placeholder 5"/>
           <p:cNvSpPr>
             <a:spLocks noGrp="1"/>
           </p:cNvSpPr>
@@ -335,7 +308,7 @@
     </p:spTree>
     <p:extLst>
       <p:ext uri="{BB962C8B-B14F-4D97-AF65-F5344CB8AC3E}">
-        <p14:creationId xmlns:p14="http://schemas.microsoft.com/office/powerpoint/2010/main" val="2857762445"/>
+        <p14:creationId xmlns:p14="http://schemas.microsoft.com/office/powerpoint/2010/main" val="2435263872"/>
       </p:ext>
     </p:extLst>
   </p:cSld>
@@ -364,13 +337,7 @@
       </p:grpSpPr>
       <p:sp>
         <p:nvSpPr>
-          <p:cNvPr id="2" name="标题 1">
-            <a:extLst>
-              <a:ext uri="{FF2B5EF4-FFF2-40B4-BE49-F238E27FC236}">
-                <a16:creationId xmlns:a16="http://schemas.microsoft.com/office/drawing/2014/main" id="{620524D7-9CCB-834F-2934-27C612A319DD}"/>
-              </a:ext>
-            </a:extLst>
-          </p:cNvPr>
+          <p:cNvPr id="2" name="Title 1"/>
           <p:cNvSpPr>
             <a:spLocks noGrp="1"/>
           </p:cNvSpPr>
@@ -387,19 +354,13 @@
               <a:rPr lang="zh-CN" altLang="en-US"/>
               <a:t>单击此处编辑母版标题样式</a:t>
             </a:r>
-            <a:endParaRPr lang="en-GB"/>
-          </a:p>
-        </p:txBody>
-      </p:sp>
-      <p:sp>
-        <p:nvSpPr>
-          <p:cNvPr id="3" name="竖排文字占位符 2">
-            <a:extLst>
-              <a:ext uri="{FF2B5EF4-FFF2-40B4-BE49-F238E27FC236}">
-                <a16:creationId xmlns:a16="http://schemas.microsoft.com/office/drawing/2014/main" id="{8BA0CD42-B86A-6A22-B5CC-511A82830411}"/>
-              </a:ext>
-            </a:extLst>
-          </p:cNvPr>
+            <a:endParaRPr lang="en-US" dirty="0"/>
+          </a:p>
+        </p:txBody>
+      </p:sp>
+      <p:sp>
+        <p:nvSpPr>
+          <p:cNvPr id="3" name="Vertical Text Placeholder 2"/>
           <p:cNvSpPr>
             <a:spLocks noGrp="1"/>
           </p:cNvSpPr>
@@ -445,19 +406,13 @@
               <a:rPr lang="zh-CN" altLang="en-US"/>
               <a:t>五级</a:t>
             </a:r>
-            <a:endParaRPr lang="en-GB"/>
-          </a:p>
-        </p:txBody>
-      </p:sp>
-      <p:sp>
-        <p:nvSpPr>
-          <p:cNvPr id="4" name="日期占位符 3">
-            <a:extLst>
-              <a:ext uri="{FF2B5EF4-FFF2-40B4-BE49-F238E27FC236}">
-                <a16:creationId xmlns:a16="http://schemas.microsoft.com/office/drawing/2014/main" id="{80466212-6DB2-1E77-A82F-33939820BC78}"/>
-              </a:ext>
-            </a:extLst>
-          </p:cNvPr>
+            <a:endParaRPr lang="en-US" dirty="0"/>
+          </a:p>
+        </p:txBody>
+      </p:sp>
+      <p:sp>
+        <p:nvSpPr>
+          <p:cNvPr id="4" name="Date Placeholder 3"/>
           <p:cNvSpPr>
             <a:spLocks noGrp="1"/>
           </p:cNvSpPr>
@@ -480,13 +435,7 @@
       </p:sp>
       <p:sp>
         <p:nvSpPr>
-          <p:cNvPr id="5" name="页脚占位符 4">
-            <a:extLst>
-              <a:ext uri="{FF2B5EF4-FFF2-40B4-BE49-F238E27FC236}">
-                <a16:creationId xmlns:a16="http://schemas.microsoft.com/office/drawing/2014/main" id="{314DA9B0-E70C-8725-7B85-2931F125636B}"/>
-              </a:ext>
-            </a:extLst>
-          </p:cNvPr>
+          <p:cNvPr id="5" name="Footer Placeholder 4"/>
           <p:cNvSpPr>
             <a:spLocks noGrp="1"/>
           </p:cNvSpPr>
@@ -505,13 +454,7 @@
       </p:sp>
       <p:sp>
         <p:nvSpPr>
-          <p:cNvPr id="6" name="灯片编号占位符 5">
-            <a:extLst>
-              <a:ext uri="{FF2B5EF4-FFF2-40B4-BE49-F238E27FC236}">
-                <a16:creationId xmlns:a16="http://schemas.microsoft.com/office/drawing/2014/main" id="{7C2B2CEA-B5CE-B793-575A-2F4162F8068E}"/>
-              </a:ext>
-            </a:extLst>
-          </p:cNvPr>
+          <p:cNvPr id="6" name="Slide Number Placeholder 5"/>
           <p:cNvSpPr>
             <a:spLocks noGrp="1"/>
           </p:cNvSpPr>
@@ -535,7 +478,7 @@
     </p:spTree>
     <p:extLst>
       <p:ext uri="{BB962C8B-B14F-4D97-AF65-F5344CB8AC3E}">
-        <p14:creationId xmlns:p14="http://schemas.microsoft.com/office/powerpoint/2010/main" val="974797162"/>
+        <p14:creationId xmlns:p14="http://schemas.microsoft.com/office/powerpoint/2010/main" val="418485640"/>
       </p:ext>
     </p:extLst>
   </p:cSld>
@@ -564,13 +507,7 @@
       </p:grpSpPr>
       <p:sp>
         <p:nvSpPr>
-          <p:cNvPr id="2" name="竖排标题 1">
-            <a:extLst>
-              <a:ext uri="{FF2B5EF4-FFF2-40B4-BE49-F238E27FC236}">
-                <a16:creationId xmlns:a16="http://schemas.microsoft.com/office/drawing/2014/main" id="{9134261E-A9F8-425F-76AD-F5B7D470ADA7}"/>
-              </a:ext>
-            </a:extLst>
-          </p:cNvPr>
+          <p:cNvPr id="2" name="Vertical Title 1"/>
           <p:cNvSpPr>
             <a:spLocks noGrp="1"/>
           </p:cNvSpPr>
@@ -580,8 +517,8 @@
         </p:nvSpPr>
         <p:spPr>
           <a:xfrm>
-            <a:off x="8724900" y="365125"/>
-            <a:ext cx="2628900" cy="5811838"/>
+            <a:off x="7728580" y="191691"/>
+            <a:ext cx="2328699" cy="3051215"/>
           </a:xfrm>
         </p:spPr>
         <p:txBody>
@@ -592,19 +529,13 @@
               <a:rPr lang="zh-CN" altLang="en-US"/>
               <a:t>单击此处编辑母版标题样式</a:t>
             </a:r>
-            <a:endParaRPr lang="en-GB"/>
-          </a:p>
-        </p:txBody>
-      </p:sp>
-      <p:sp>
-        <p:nvSpPr>
-          <p:cNvPr id="3" name="竖排文字占位符 2">
-            <a:extLst>
-              <a:ext uri="{FF2B5EF4-FFF2-40B4-BE49-F238E27FC236}">
-                <a16:creationId xmlns:a16="http://schemas.microsoft.com/office/drawing/2014/main" id="{2CB3BF96-7E9D-FEA4-3677-6C881C7DA949}"/>
-              </a:ext>
-            </a:extLst>
-          </p:cNvPr>
+            <a:endParaRPr lang="en-US" dirty="0"/>
+          </a:p>
+        </p:txBody>
+      </p:sp>
+      <p:sp>
+        <p:nvSpPr>
+          <p:cNvPr id="3" name="Vertical Text Placeholder 2"/>
           <p:cNvSpPr>
             <a:spLocks noGrp="1"/>
           </p:cNvSpPr>
@@ -614,8 +545,8 @@
         </p:nvSpPr>
         <p:spPr>
           <a:xfrm>
-            <a:off x="838200" y="365125"/>
-            <a:ext cx="7734300" cy="5811838"/>
+            <a:off x="742484" y="191691"/>
+            <a:ext cx="6851100" cy="3051215"/>
           </a:xfrm>
         </p:spPr>
         <p:txBody>
@@ -655,19 +586,13 @@
               <a:rPr lang="zh-CN" altLang="en-US"/>
               <a:t>五级</a:t>
             </a:r>
-            <a:endParaRPr lang="en-GB"/>
-          </a:p>
-        </p:txBody>
-      </p:sp>
-      <p:sp>
-        <p:nvSpPr>
-          <p:cNvPr id="4" name="日期占位符 3">
-            <a:extLst>
-              <a:ext uri="{FF2B5EF4-FFF2-40B4-BE49-F238E27FC236}">
-                <a16:creationId xmlns:a16="http://schemas.microsoft.com/office/drawing/2014/main" id="{BEBB94BA-02A8-B9AF-A3D6-03EB4F6E11BC}"/>
-              </a:ext>
-            </a:extLst>
-          </p:cNvPr>
+            <a:endParaRPr lang="en-US" dirty="0"/>
+          </a:p>
+        </p:txBody>
+      </p:sp>
+      <p:sp>
+        <p:nvSpPr>
+          <p:cNvPr id="4" name="Date Placeholder 3"/>
           <p:cNvSpPr>
             <a:spLocks noGrp="1"/>
           </p:cNvSpPr>
@@ -690,13 +615,7 @@
       </p:sp>
       <p:sp>
         <p:nvSpPr>
-          <p:cNvPr id="5" name="页脚占位符 4">
-            <a:extLst>
-              <a:ext uri="{FF2B5EF4-FFF2-40B4-BE49-F238E27FC236}">
-                <a16:creationId xmlns:a16="http://schemas.microsoft.com/office/drawing/2014/main" id="{F12D6E63-58A9-3438-D40E-D42EC1671023}"/>
-              </a:ext>
-            </a:extLst>
-          </p:cNvPr>
+          <p:cNvPr id="5" name="Footer Placeholder 4"/>
           <p:cNvSpPr>
             <a:spLocks noGrp="1"/>
           </p:cNvSpPr>
@@ -715,13 +634,7 @@
       </p:sp>
       <p:sp>
         <p:nvSpPr>
-          <p:cNvPr id="6" name="灯片编号占位符 5">
-            <a:extLst>
-              <a:ext uri="{FF2B5EF4-FFF2-40B4-BE49-F238E27FC236}">
-                <a16:creationId xmlns:a16="http://schemas.microsoft.com/office/drawing/2014/main" id="{ADB4F41A-918C-4FA2-B636-79876B22F3AC}"/>
-              </a:ext>
-            </a:extLst>
-          </p:cNvPr>
+          <p:cNvPr id="6" name="Slide Number Placeholder 5"/>
           <p:cNvSpPr>
             <a:spLocks noGrp="1"/>
           </p:cNvSpPr>
@@ -745,7 +658,7 @@
     </p:spTree>
     <p:extLst>
       <p:ext uri="{BB962C8B-B14F-4D97-AF65-F5344CB8AC3E}">
-        <p14:creationId xmlns:p14="http://schemas.microsoft.com/office/powerpoint/2010/main" val="1669895160"/>
+        <p14:creationId xmlns:p14="http://schemas.microsoft.com/office/powerpoint/2010/main" val="3672957686"/>
       </p:ext>
     </p:extLst>
   </p:cSld>
@@ -774,13 +687,7 @@
       </p:grpSpPr>
       <p:sp>
         <p:nvSpPr>
-          <p:cNvPr id="2" name="标题 1">
-            <a:extLst>
-              <a:ext uri="{FF2B5EF4-FFF2-40B4-BE49-F238E27FC236}">
-                <a16:creationId xmlns:a16="http://schemas.microsoft.com/office/drawing/2014/main" id="{6208531D-7BF8-744C-C4BE-E6B997B0B4A5}"/>
-              </a:ext>
-            </a:extLst>
-          </p:cNvPr>
+          <p:cNvPr id="2" name="Title 1"/>
           <p:cNvSpPr>
             <a:spLocks noGrp="1"/>
           </p:cNvSpPr>
@@ -797,19 +704,13 @@
               <a:rPr lang="zh-CN" altLang="en-US"/>
               <a:t>单击此处编辑母版标题样式</a:t>
             </a:r>
-            <a:endParaRPr lang="en-GB"/>
-          </a:p>
-        </p:txBody>
-      </p:sp>
-      <p:sp>
-        <p:nvSpPr>
-          <p:cNvPr id="3" name="内容占位符 2">
-            <a:extLst>
-              <a:ext uri="{FF2B5EF4-FFF2-40B4-BE49-F238E27FC236}">
-                <a16:creationId xmlns:a16="http://schemas.microsoft.com/office/drawing/2014/main" id="{3DA8ED5D-8FB0-0153-5A5F-A948C1197A54}"/>
-              </a:ext>
-            </a:extLst>
-          </p:cNvPr>
+            <a:endParaRPr lang="en-US" dirty="0"/>
+          </a:p>
+        </p:txBody>
+      </p:sp>
+      <p:sp>
+        <p:nvSpPr>
+          <p:cNvPr id="3" name="Content Placeholder 2"/>
           <p:cNvSpPr>
             <a:spLocks noGrp="1"/>
           </p:cNvSpPr>
@@ -855,19 +756,13 @@
               <a:rPr lang="zh-CN" altLang="en-US"/>
               <a:t>五级</a:t>
             </a:r>
-            <a:endParaRPr lang="en-GB"/>
-          </a:p>
-        </p:txBody>
-      </p:sp>
-      <p:sp>
-        <p:nvSpPr>
-          <p:cNvPr id="4" name="日期占位符 3">
-            <a:extLst>
-              <a:ext uri="{FF2B5EF4-FFF2-40B4-BE49-F238E27FC236}">
-                <a16:creationId xmlns:a16="http://schemas.microsoft.com/office/drawing/2014/main" id="{82456E87-7D0C-14BB-CBD1-4C03E7EA09E4}"/>
-              </a:ext>
-            </a:extLst>
-          </p:cNvPr>
+            <a:endParaRPr lang="en-US" dirty="0"/>
+          </a:p>
+        </p:txBody>
+      </p:sp>
+      <p:sp>
+        <p:nvSpPr>
+          <p:cNvPr id="4" name="Date Placeholder 3"/>
           <p:cNvSpPr>
             <a:spLocks noGrp="1"/>
           </p:cNvSpPr>
@@ -890,13 +785,7 @@
       </p:sp>
       <p:sp>
         <p:nvSpPr>
-          <p:cNvPr id="5" name="页脚占位符 4">
-            <a:extLst>
-              <a:ext uri="{FF2B5EF4-FFF2-40B4-BE49-F238E27FC236}">
-                <a16:creationId xmlns:a16="http://schemas.microsoft.com/office/drawing/2014/main" id="{CC5E09EA-7C2E-2C4E-4AA9-24C6B3D9BA78}"/>
-              </a:ext>
-            </a:extLst>
-          </p:cNvPr>
+          <p:cNvPr id="5" name="Footer Placeholder 4"/>
           <p:cNvSpPr>
             <a:spLocks noGrp="1"/>
           </p:cNvSpPr>
@@ -915,13 +804,7 @@
       </p:sp>
       <p:sp>
         <p:nvSpPr>
-          <p:cNvPr id="6" name="灯片编号占位符 5">
-            <a:extLst>
-              <a:ext uri="{FF2B5EF4-FFF2-40B4-BE49-F238E27FC236}">
-                <a16:creationId xmlns:a16="http://schemas.microsoft.com/office/drawing/2014/main" id="{2B6DF9E9-227B-FDC7-9BBD-D36875E3A4DF}"/>
-              </a:ext>
-            </a:extLst>
-          </p:cNvPr>
+          <p:cNvPr id="6" name="Slide Number Placeholder 5"/>
           <p:cNvSpPr>
             <a:spLocks noGrp="1"/>
           </p:cNvSpPr>
@@ -945,7 +828,7 @@
     </p:spTree>
     <p:extLst>
       <p:ext uri="{BB962C8B-B14F-4D97-AF65-F5344CB8AC3E}">
-        <p14:creationId xmlns:p14="http://schemas.microsoft.com/office/powerpoint/2010/main" val="886236125"/>
+        <p14:creationId xmlns:p14="http://schemas.microsoft.com/office/powerpoint/2010/main" val="4211587872"/>
       </p:ext>
     </p:extLst>
   </p:cSld>
@@ -974,13 +857,7 @@
       </p:grpSpPr>
       <p:sp>
         <p:nvSpPr>
-          <p:cNvPr id="2" name="标题 1">
-            <a:extLst>
-              <a:ext uri="{FF2B5EF4-FFF2-40B4-BE49-F238E27FC236}">
-                <a16:creationId xmlns:a16="http://schemas.microsoft.com/office/drawing/2014/main" id="{1C436234-2AA8-1891-0208-B62BFDAD8BF5}"/>
-              </a:ext>
-            </a:extLst>
-          </p:cNvPr>
+          <p:cNvPr id="2" name="Title 1"/>
           <p:cNvSpPr>
             <a:spLocks noGrp="1"/>
           </p:cNvSpPr>
@@ -990,15 +867,15 @@
         </p:nvSpPr>
         <p:spPr>
           <a:xfrm>
-            <a:off x="831850" y="1709738"/>
-            <a:ext cx="10515600" cy="2852737"/>
+            <a:off x="736859" y="897613"/>
+            <a:ext cx="9314796" cy="1497687"/>
           </a:xfrm>
         </p:spPr>
         <p:txBody>
           <a:bodyPr anchor="b"/>
           <a:lstStyle>
             <a:lvl1pPr>
-              <a:defRPr sz="6000"/>
+              <a:defRPr sz="3150"/>
             </a:lvl1pPr>
           </a:lstStyle>
           <a:p>
@@ -1006,19 +883,13 @@
               <a:rPr lang="zh-CN" altLang="en-US"/>
               <a:t>单击此处编辑母版标题样式</a:t>
             </a:r>
-            <a:endParaRPr lang="en-GB"/>
-          </a:p>
-        </p:txBody>
-      </p:sp>
-      <p:sp>
-        <p:nvSpPr>
-          <p:cNvPr id="3" name="文本占位符 2">
-            <a:extLst>
-              <a:ext uri="{FF2B5EF4-FFF2-40B4-BE49-F238E27FC236}">
-                <a16:creationId xmlns:a16="http://schemas.microsoft.com/office/drawing/2014/main" id="{433A259B-F70C-6F1C-6D63-EDACBDA73247}"/>
-              </a:ext>
-            </a:extLst>
-          </p:cNvPr>
+            <a:endParaRPr lang="en-US" dirty="0"/>
+          </a:p>
+        </p:txBody>
+      </p:sp>
+      <p:sp>
+        <p:nvSpPr>
+          <p:cNvPr id="3" name="Text Placeholder 2"/>
           <p:cNvSpPr>
             <a:spLocks noGrp="1"/>
           </p:cNvSpPr>
@@ -1028,8 +899,8 @@
         </p:nvSpPr>
         <p:spPr>
           <a:xfrm>
-            <a:off x="831850" y="4589463"/>
-            <a:ext cx="10515600" cy="1500187"/>
+            <a:off x="736859" y="2409468"/>
+            <a:ext cx="9314796" cy="787598"/>
           </a:xfrm>
         </p:spPr>
         <p:txBody>
@@ -1037,7 +908,7 @@
           <a:lstStyle>
             <a:lvl1pPr marL="0" indent="0">
               <a:buNone/>
-              <a:defRPr sz="2400">
+              <a:defRPr sz="1260">
                 <a:solidFill>
                   <a:schemeClr val="tx1">
                     <a:tint val="82000"/>
@@ -1045,9 +916,9 @@
                 </a:solidFill>
               </a:defRPr>
             </a:lvl1pPr>
-            <a:lvl2pPr marL="457200" indent="0">
-              <a:buNone/>
-              <a:defRPr sz="2000">
+            <a:lvl2pPr marL="240030" indent="0">
+              <a:buNone/>
+              <a:defRPr sz="1050">
                 <a:solidFill>
                   <a:schemeClr val="tx1">
                     <a:tint val="82000"/>
@@ -1055,9 +926,9 @@
                 </a:solidFill>
               </a:defRPr>
             </a:lvl2pPr>
-            <a:lvl3pPr marL="914400" indent="0">
-              <a:buNone/>
-              <a:defRPr sz="1800">
+            <a:lvl3pPr marL="480060" indent="0">
+              <a:buNone/>
+              <a:defRPr sz="945">
                 <a:solidFill>
                   <a:schemeClr val="tx1">
                     <a:tint val="82000"/>
@@ -1065,9 +936,9 @@
                 </a:solidFill>
               </a:defRPr>
             </a:lvl3pPr>
-            <a:lvl4pPr marL="1371600" indent="0">
-              <a:buNone/>
-              <a:defRPr sz="1600">
+            <a:lvl4pPr marL="720090" indent="0">
+              <a:buNone/>
+              <a:defRPr sz="840">
                 <a:solidFill>
                   <a:schemeClr val="tx1">
                     <a:tint val="82000"/>
@@ -1075,9 +946,9 @@
                 </a:solidFill>
               </a:defRPr>
             </a:lvl4pPr>
-            <a:lvl5pPr marL="1828800" indent="0">
-              <a:buNone/>
-              <a:defRPr sz="1600">
+            <a:lvl5pPr marL="960120" indent="0">
+              <a:buNone/>
+              <a:defRPr sz="840">
                 <a:solidFill>
                   <a:schemeClr val="tx1">
                     <a:tint val="82000"/>
@@ -1085,9 +956,9 @@
                 </a:solidFill>
               </a:defRPr>
             </a:lvl5pPr>
-            <a:lvl6pPr marL="2286000" indent="0">
-              <a:buNone/>
-              <a:defRPr sz="1600">
+            <a:lvl6pPr marL="1200150" indent="0">
+              <a:buNone/>
+              <a:defRPr sz="840">
                 <a:solidFill>
                   <a:schemeClr val="tx1">
                     <a:tint val="82000"/>
@@ -1095,9 +966,9 @@
                 </a:solidFill>
               </a:defRPr>
             </a:lvl6pPr>
-            <a:lvl7pPr marL="2743200" indent="0">
-              <a:buNone/>
-              <a:defRPr sz="1600">
+            <a:lvl7pPr marL="1440180" indent="0">
+              <a:buNone/>
+              <a:defRPr sz="840">
                 <a:solidFill>
                   <a:schemeClr val="tx1">
                     <a:tint val="82000"/>
@@ -1105,9 +976,9 @@
                 </a:solidFill>
               </a:defRPr>
             </a:lvl7pPr>
-            <a:lvl8pPr marL="3200400" indent="0">
-              <a:buNone/>
-              <a:defRPr sz="1600">
+            <a:lvl8pPr marL="1680210" indent="0">
+              <a:buNone/>
+              <a:defRPr sz="840">
                 <a:solidFill>
                   <a:schemeClr val="tx1">
                     <a:tint val="82000"/>
@@ -1115,9 +986,9 @@
                 </a:solidFill>
               </a:defRPr>
             </a:lvl8pPr>
-            <a:lvl9pPr marL="3657600" indent="0">
-              <a:buNone/>
-              <a:defRPr sz="1600">
+            <a:lvl9pPr marL="1920240" indent="0">
+              <a:buNone/>
+              <a:defRPr sz="840">
                 <a:solidFill>
                   <a:schemeClr val="tx1">
                     <a:tint val="82000"/>
@@ -1137,13 +1008,7 @@
       </p:sp>
       <p:sp>
         <p:nvSpPr>
-          <p:cNvPr id="4" name="日期占位符 3">
-            <a:extLst>
-              <a:ext uri="{FF2B5EF4-FFF2-40B4-BE49-F238E27FC236}">
-                <a16:creationId xmlns:a16="http://schemas.microsoft.com/office/drawing/2014/main" id="{CD6B4C01-3BC6-3E18-1DEE-29799C4163BD}"/>
-              </a:ext>
-            </a:extLst>
-          </p:cNvPr>
+          <p:cNvPr id="4" name="Date Placeholder 3"/>
           <p:cNvSpPr>
             <a:spLocks noGrp="1"/>
           </p:cNvSpPr>
@@ -1166,13 +1031,7 @@
       </p:sp>
       <p:sp>
         <p:nvSpPr>
-          <p:cNvPr id="5" name="页脚占位符 4">
-            <a:extLst>
-              <a:ext uri="{FF2B5EF4-FFF2-40B4-BE49-F238E27FC236}">
-                <a16:creationId xmlns:a16="http://schemas.microsoft.com/office/drawing/2014/main" id="{7F2582DE-BE79-C3E4-81C7-0FA104DC3604}"/>
-              </a:ext>
-            </a:extLst>
-          </p:cNvPr>
+          <p:cNvPr id="5" name="Footer Placeholder 4"/>
           <p:cNvSpPr>
             <a:spLocks noGrp="1"/>
           </p:cNvSpPr>
@@ -1191,13 +1050,7 @@
       </p:sp>
       <p:sp>
         <p:nvSpPr>
-          <p:cNvPr id="6" name="灯片编号占位符 5">
-            <a:extLst>
-              <a:ext uri="{FF2B5EF4-FFF2-40B4-BE49-F238E27FC236}">
-                <a16:creationId xmlns:a16="http://schemas.microsoft.com/office/drawing/2014/main" id="{C4669AC8-1FA2-9F34-6CF2-AAF4C960404D}"/>
-              </a:ext>
-            </a:extLst>
-          </p:cNvPr>
+          <p:cNvPr id="6" name="Slide Number Placeholder 5"/>
           <p:cNvSpPr>
             <a:spLocks noGrp="1"/>
           </p:cNvSpPr>
@@ -1221,7 +1074,7 @@
     </p:spTree>
     <p:extLst>
       <p:ext uri="{BB962C8B-B14F-4D97-AF65-F5344CB8AC3E}">
-        <p14:creationId xmlns:p14="http://schemas.microsoft.com/office/powerpoint/2010/main" val="1791921182"/>
+        <p14:creationId xmlns:p14="http://schemas.microsoft.com/office/powerpoint/2010/main" val="1655558589"/>
       </p:ext>
     </p:extLst>
   </p:cSld>
@@ -1250,13 +1103,7 @@
       </p:grpSpPr>
       <p:sp>
         <p:nvSpPr>
-          <p:cNvPr id="2" name="标题 1">
-            <a:extLst>
-              <a:ext uri="{FF2B5EF4-FFF2-40B4-BE49-F238E27FC236}">
-                <a16:creationId xmlns:a16="http://schemas.microsoft.com/office/drawing/2014/main" id="{9D0567FB-9B49-9794-5B50-7F915AB3261B}"/>
-              </a:ext>
-            </a:extLst>
-          </p:cNvPr>
+          <p:cNvPr id="2" name="Title 1"/>
           <p:cNvSpPr>
             <a:spLocks noGrp="1"/>
           </p:cNvSpPr>
@@ -1273,19 +1120,13 @@
               <a:rPr lang="zh-CN" altLang="en-US"/>
               <a:t>单击此处编辑母版标题样式</a:t>
             </a:r>
-            <a:endParaRPr lang="en-GB"/>
-          </a:p>
-        </p:txBody>
-      </p:sp>
-      <p:sp>
-        <p:nvSpPr>
-          <p:cNvPr id="3" name="内容占位符 2">
-            <a:extLst>
-              <a:ext uri="{FF2B5EF4-FFF2-40B4-BE49-F238E27FC236}">
-                <a16:creationId xmlns:a16="http://schemas.microsoft.com/office/drawing/2014/main" id="{F10C93F0-CACD-125A-95D1-D026D46E1BAE}"/>
-              </a:ext>
-            </a:extLst>
-          </p:cNvPr>
+            <a:endParaRPr lang="en-US" dirty="0"/>
+          </a:p>
+        </p:txBody>
+      </p:sp>
+      <p:sp>
+        <p:nvSpPr>
+          <p:cNvPr id="3" name="Content Placeholder 2"/>
           <p:cNvSpPr>
             <a:spLocks noGrp="1"/>
           </p:cNvSpPr>
@@ -1295,8 +1136,8 @@
         </p:nvSpPr>
         <p:spPr>
           <a:xfrm>
-            <a:off x="838200" y="1825625"/>
-            <a:ext cx="5181600" cy="4351338"/>
+            <a:off x="742484" y="958453"/>
+            <a:ext cx="4589899" cy="2284452"/>
           </a:xfrm>
         </p:spPr>
         <p:txBody>
@@ -1336,19 +1177,13 @@
               <a:rPr lang="zh-CN" altLang="en-US"/>
               <a:t>五级</a:t>
             </a:r>
-            <a:endParaRPr lang="en-GB"/>
-          </a:p>
-        </p:txBody>
-      </p:sp>
-      <p:sp>
-        <p:nvSpPr>
-          <p:cNvPr id="4" name="内容占位符 3">
-            <a:extLst>
-              <a:ext uri="{FF2B5EF4-FFF2-40B4-BE49-F238E27FC236}">
-                <a16:creationId xmlns:a16="http://schemas.microsoft.com/office/drawing/2014/main" id="{2D77E288-F52B-6B66-B509-9CB883705149}"/>
-              </a:ext>
-            </a:extLst>
-          </p:cNvPr>
+            <a:endParaRPr lang="en-US" dirty="0"/>
+          </a:p>
+        </p:txBody>
+      </p:sp>
+      <p:sp>
+        <p:nvSpPr>
+          <p:cNvPr id="4" name="Content Placeholder 3"/>
           <p:cNvSpPr>
             <a:spLocks noGrp="1"/>
           </p:cNvSpPr>
@@ -1358,8 +1193,8 @@
         </p:nvSpPr>
         <p:spPr>
           <a:xfrm>
-            <a:off x="6172200" y="1825625"/>
-            <a:ext cx="5181600" cy="4351338"/>
+            <a:off x="5467380" y="958453"/>
+            <a:ext cx="4589899" cy="2284452"/>
           </a:xfrm>
         </p:spPr>
         <p:txBody>
@@ -1399,19 +1234,13 @@
               <a:rPr lang="zh-CN" altLang="en-US"/>
               <a:t>五级</a:t>
             </a:r>
-            <a:endParaRPr lang="en-GB"/>
-          </a:p>
-        </p:txBody>
-      </p:sp>
-      <p:sp>
-        <p:nvSpPr>
-          <p:cNvPr id="5" name="日期占位符 4">
-            <a:extLst>
-              <a:ext uri="{FF2B5EF4-FFF2-40B4-BE49-F238E27FC236}">
-                <a16:creationId xmlns:a16="http://schemas.microsoft.com/office/drawing/2014/main" id="{EEF361FA-71D6-B2EB-3FC2-7254E739EEA5}"/>
-              </a:ext>
-            </a:extLst>
-          </p:cNvPr>
+            <a:endParaRPr lang="en-US" dirty="0"/>
+          </a:p>
+        </p:txBody>
+      </p:sp>
+      <p:sp>
+        <p:nvSpPr>
+          <p:cNvPr id="5" name="Date Placeholder 4"/>
           <p:cNvSpPr>
             <a:spLocks noGrp="1"/>
           </p:cNvSpPr>
@@ -1434,13 +1263,7 @@
       </p:sp>
       <p:sp>
         <p:nvSpPr>
-          <p:cNvPr id="6" name="页脚占位符 5">
-            <a:extLst>
-              <a:ext uri="{FF2B5EF4-FFF2-40B4-BE49-F238E27FC236}">
-                <a16:creationId xmlns:a16="http://schemas.microsoft.com/office/drawing/2014/main" id="{095EC462-5FA6-42FC-549C-34B32F122291}"/>
-              </a:ext>
-            </a:extLst>
-          </p:cNvPr>
+          <p:cNvPr id="6" name="Footer Placeholder 5"/>
           <p:cNvSpPr>
             <a:spLocks noGrp="1"/>
           </p:cNvSpPr>
@@ -1459,13 +1282,7 @@
       </p:sp>
       <p:sp>
         <p:nvSpPr>
-          <p:cNvPr id="7" name="灯片编号占位符 6">
-            <a:extLst>
-              <a:ext uri="{FF2B5EF4-FFF2-40B4-BE49-F238E27FC236}">
-                <a16:creationId xmlns:a16="http://schemas.microsoft.com/office/drawing/2014/main" id="{BCC61FEF-1F04-F3EA-8227-B5361037E699}"/>
-              </a:ext>
-            </a:extLst>
-          </p:cNvPr>
+          <p:cNvPr id="7" name="Slide Number Placeholder 6"/>
           <p:cNvSpPr>
             <a:spLocks noGrp="1"/>
           </p:cNvSpPr>
@@ -1489,7 +1306,7 @@
     </p:spTree>
     <p:extLst>
       <p:ext uri="{BB962C8B-B14F-4D97-AF65-F5344CB8AC3E}">
-        <p14:creationId xmlns:p14="http://schemas.microsoft.com/office/powerpoint/2010/main" val="2759924"/>
+        <p14:creationId xmlns:p14="http://schemas.microsoft.com/office/powerpoint/2010/main" val="2384428803"/>
       </p:ext>
     </p:extLst>
   </p:cSld>
@@ -1518,13 +1335,7 @@
       </p:grpSpPr>
       <p:sp>
         <p:nvSpPr>
-          <p:cNvPr id="2" name="标题 1">
-            <a:extLst>
-              <a:ext uri="{FF2B5EF4-FFF2-40B4-BE49-F238E27FC236}">
-                <a16:creationId xmlns:a16="http://schemas.microsoft.com/office/drawing/2014/main" id="{B57AF134-04B9-8526-8B77-FA5A4CBC3AA6}"/>
-              </a:ext>
-            </a:extLst>
-          </p:cNvPr>
+          <p:cNvPr id="2" name="Title 1"/>
           <p:cNvSpPr>
             <a:spLocks noGrp="1"/>
           </p:cNvSpPr>
@@ -1534,8 +1345,8 @@
         </p:nvSpPr>
         <p:spPr>
           <a:xfrm>
-            <a:off x="839788" y="365125"/>
-            <a:ext cx="10515600" cy="1325563"/>
+            <a:off x="743890" y="191691"/>
+            <a:ext cx="9314796" cy="695921"/>
           </a:xfrm>
         </p:spPr>
         <p:txBody>
@@ -1546,19 +1357,13 @@
               <a:rPr lang="zh-CN" altLang="en-US"/>
               <a:t>单击此处编辑母版标题样式</a:t>
             </a:r>
-            <a:endParaRPr lang="en-GB"/>
-          </a:p>
-        </p:txBody>
-      </p:sp>
-      <p:sp>
-        <p:nvSpPr>
-          <p:cNvPr id="3" name="文本占位符 2">
-            <a:extLst>
-              <a:ext uri="{FF2B5EF4-FFF2-40B4-BE49-F238E27FC236}">
-                <a16:creationId xmlns:a16="http://schemas.microsoft.com/office/drawing/2014/main" id="{740BE12F-15C7-EFE7-F602-43F5A358E808}"/>
-              </a:ext>
-            </a:extLst>
-          </p:cNvPr>
+            <a:endParaRPr lang="en-US" dirty="0"/>
+          </a:p>
+        </p:txBody>
+      </p:sp>
+      <p:sp>
+        <p:nvSpPr>
+          <p:cNvPr id="3" name="Text Placeholder 2"/>
           <p:cNvSpPr>
             <a:spLocks noGrp="1"/>
           </p:cNvSpPr>
@@ -1568,8 +1373,8 @@
         </p:nvSpPr>
         <p:spPr>
           <a:xfrm>
-            <a:off x="839788" y="1681163"/>
-            <a:ext cx="5157787" cy="823912"/>
+            <a:off x="743891" y="882610"/>
+            <a:ext cx="4568806" cy="432554"/>
           </a:xfrm>
         </p:spPr>
         <p:txBody>
@@ -1577,39 +1382,39 @@
           <a:lstStyle>
             <a:lvl1pPr marL="0" indent="0">
               <a:buNone/>
-              <a:defRPr sz="2400" b="1"/>
+              <a:defRPr sz="1260" b="1"/>
             </a:lvl1pPr>
-            <a:lvl2pPr marL="457200" indent="0">
-              <a:buNone/>
-              <a:defRPr sz="2000" b="1"/>
+            <a:lvl2pPr marL="240030" indent="0">
+              <a:buNone/>
+              <a:defRPr sz="1050" b="1"/>
             </a:lvl2pPr>
-            <a:lvl3pPr marL="914400" indent="0">
-              <a:buNone/>
-              <a:defRPr sz="1800" b="1"/>
+            <a:lvl3pPr marL="480060" indent="0">
+              <a:buNone/>
+              <a:defRPr sz="945" b="1"/>
             </a:lvl3pPr>
-            <a:lvl4pPr marL="1371600" indent="0">
-              <a:buNone/>
-              <a:defRPr sz="1600" b="1"/>
+            <a:lvl4pPr marL="720090" indent="0">
+              <a:buNone/>
+              <a:defRPr sz="840" b="1"/>
             </a:lvl4pPr>
-            <a:lvl5pPr marL="1828800" indent="0">
-              <a:buNone/>
-              <a:defRPr sz="1600" b="1"/>
+            <a:lvl5pPr marL="960120" indent="0">
+              <a:buNone/>
+              <a:defRPr sz="840" b="1"/>
             </a:lvl5pPr>
-            <a:lvl6pPr marL="2286000" indent="0">
-              <a:buNone/>
-              <a:defRPr sz="1600" b="1"/>
+            <a:lvl6pPr marL="1200150" indent="0">
+              <a:buNone/>
+              <a:defRPr sz="840" b="1"/>
             </a:lvl6pPr>
-            <a:lvl7pPr marL="2743200" indent="0">
-              <a:buNone/>
-              <a:defRPr sz="1600" b="1"/>
+            <a:lvl7pPr marL="1440180" indent="0">
+              <a:buNone/>
+              <a:defRPr sz="840" b="1"/>
             </a:lvl7pPr>
-            <a:lvl8pPr marL="3200400" indent="0">
-              <a:buNone/>
-              <a:defRPr sz="1600" b="1"/>
+            <a:lvl8pPr marL="1680210" indent="0">
+              <a:buNone/>
+              <a:defRPr sz="840" b="1"/>
             </a:lvl8pPr>
-            <a:lvl9pPr marL="3657600" indent="0">
-              <a:buNone/>
-              <a:defRPr sz="1600" b="1"/>
+            <a:lvl9pPr marL="1920240" indent="0">
+              <a:buNone/>
+              <a:defRPr sz="840" b="1"/>
             </a:lvl9pPr>
           </a:lstStyle>
           <a:p>
@@ -1623,13 +1428,7 @@
       </p:sp>
       <p:sp>
         <p:nvSpPr>
-          <p:cNvPr id="4" name="内容占位符 3">
-            <a:extLst>
-              <a:ext uri="{FF2B5EF4-FFF2-40B4-BE49-F238E27FC236}">
-                <a16:creationId xmlns:a16="http://schemas.microsoft.com/office/drawing/2014/main" id="{72DF797D-93C2-F8CD-717F-E25D94253A46}"/>
-              </a:ext>
-            </a:extLst>
-          </p:cNvPr>
+          <p:cNvPr id="4" name="Content Placeholder 3"/>
           <p:cNvSpPr>
             <a:spLocks noGrp="1"/>
           </p:cNvSpPr>
@@ -1639,8 +1438,8 @@
         </p:nvSpPr>
         <p:spPr>
           <a:xfrm>
-            <a:off x="839788" y="2505075"/>
-            <a:ext cx="5157787" cy="3684588"/>
+            <a:off x="743891" y="1315164"/>
+            <a:ext cx="4568806" cy="1934409"/>
           </a:xfrm>
         </p:spPr>
         <p:txBody>
@@ -1680,19 +1479,13 @@
               <a:rPr lang="zh-CN" altLang="en-US"/>
               <a:t>五级</a:t>
             </a:r>
-            <a:endParaRPr lang="en-GB"/>
-          </a:p>
-        </p:txBody>
-      </p:sp>
-      <p:sp>
-        <p:nvSpPr>
-          <p:cNvPr id="5" name="文本占位符 4">
-            <a:extLst>
-              <a:ext uri="{FF2B5EF4-FFF2-40B4-BE49-F238E27FC236}">
-                <a16:creationId xmlns:a16="http://schemas.microsoft.com/office/drawing/2014/main" id="{7B6DA79A-4183-1E8D-3910-4C63DDBC6B49}"/>
-              </a:ext>
-            </a:extLst>
-          </p:cNvPr>
+            <a:endParaRPr lang="en-US" dirty="0"/>
+          </a:p>
+        </p:txBody>
+      </p:sp>
+      <p:sp>
+        <p:nvSpPr>
+          <p:cNvPr id="5" name="Text Placeholder 4"/>
           <p:cNvSpPr>
             <a:spLocks noGrp="1"/>
           </p:cNvSpPr>
@@ -1702,8 +1495,8 @@
         </p:nvSpPr>
         <p:spPr>
           <a:xfrm>
-            <a:off x="6172200" y="1681163"/>
-            <a:ext cx="5183188" cy="823912"/>
+            <a:off x="5467380" y="882610"/>
+            <a:ext cx="4591306" cy="432554"/>
           </a:xfrm>
         </p:spPr>
         <p:txBody>
@@ -1711,39 +1504,39 @@
           <a:lstStyle>
             <a:lvl1pPr marL="0" indent="0">
               <a:buNone/>
-              <a:defRPr sz="2400" b="1"/>
+              <a:defRPr sz="1260" b="1"/>
             </a:lvl1pPr>
-            <a:lvl2pPr marL="457200" indent="0">
-              <a:buNone/>
-              <a:defRPr sz="2000" b="1"/>
+            <a:lvl2pPr marL="240030" indent="0">
+              <a:buNone/>
+              <a:defRPr sz="1050" b="1"/>
             </a:lvl2pPr>
-            <a:lvl3pPr marL="914400" indent="0">
-              <a:buNone/>
-              <a:defRPr sz="1800" b="1"/>
+            <a:lvl3pPr marL="480060" indent="0">
+              <a:buNone/>
+              <a:defRPr sz="945" b="1"/>
             </a:lvl3pPr>
-            <a:lvl4pPr marL="1371600" indent="0">
-              <a:buNone/>
-              <a:defRPr sz="1600" b="1"/>
+            <a:lvl4pPr marL="720090" indent="0">
+              <a:buNone/>
+              <a:defRPr sz="840" b="1"/>
             </a:lvl4pPr>
-            <a:lvl5pPr marL="1828800" indent="0">
-              <a:buNone/>
-              <a:defRPr sz="1600" b="1"/>
+            <a:lvl5pPr marL="960120" indent="0">
+              <a:buNone/>
+              <a:defRPr sz="840" b="1"/>
             </a:lvl5pPr>
-            <a:lvl6pPr marL="2286000" indent="0">
-              <a:buNone/>
-              <a:defRPr sz="1600" b="1"/>
+            <a:lvl6pPr marL="1200150" indent="0">
+              <a:buNone/>
+              <a:defRPr sz="840" b="1"/>
             </a:lvl6pPr>
-            <a:lvl7pPr marL="2743200" indent="0">
-              <a:buNone/>
-              <a:defRPr sz="1600" b="1"/>
+            <a:lvl7pPr marL="1440180" indent="0">
+              <a:buNone/>
+              <a:defRPr sz="840" b="1"/>
             </a:lvl7pPr>
-            <a:lvl8pPr marL="3200400" indent="0">
-              <a:buNone/>
-              <a:defRPr sz="1600" b="1"/>
+            <a:lvl8pPr marL="1680210" indent="0">
+              <a:buNone/>
+              <a:defRPr sz="840" b="1"/>
             </a:lvl8pPr>
-            <a:lvl9pPr marL="3657600" indent="0">
-              <a:buNone/>
-              <a:defRPr sz="1600" b="1"/>
+            <a:lvl9pPr marL="1920240" indent="0">
+              <a:buNone/>
+              <a:defRPr sz="840" b="1"/>
             </a:lvl9pPr>
           </a:lstStyle>
           <a:p>
@@ -1757,13 +1550,7 @@
       </p:sp>
       <p:sp>
         <p:nvSpPr>
-          <p:cNvPr id="6" name="内容占位符 5">
-            <a:extLst>
-              <a:ext uri="{FF2B5EF4-FFF2-40B4-BE49-F238E27FC236}">
-                <a16:creationId xmlns:a16="http://schemas.microsoft.com/office/drawing/2014/main" id="{514DA93D-5697-C8AD-FC77-45D7909BDA30}"/>
-              </a:ext>
-            </a:extLst>
-          </p:cNvPr>
+          <p:cNvPr id="6" name="Content Placeholder 5"/>
           <p:cNvSpPr>
             <a:spLocks noGrp="1"/>
           </p:cNvSpPr>
@@ -1773,8 +1560,8 @@
         </p:nvSpPr>
         <p:spPr>
           <a:xfrm>
-            <a:off x="6172200" y="2505075"/>
-            <a:ext cx="5183188" cy="3684588"/>
+            <a:off x="5467380" y="1315164"/>
+            <a:ext cx="4591306" cy="1934409"/>
           </a:xfrm>
         </p:spPr>
         <p:txBody>
@@ -1814,19 +1601,13 @@
               <a:rPr lang="zh-CN" altLang="en-US"/>
               <a:t>五级</a:t>
             </a:r>
-            <a:endParaRPr lang="en-GB"/>
-          </a:p>
-        </p:txBody>
-      </p:sp>
-      <p:sp>
-        <p:nvSpPr>
-          <p:cNvPr id="7" name="日期占位符 6">
-            <a:extLst>
-              <a:ext uri="{FF2B5EF4-FFF2-40B4-BE49-F238E27FC236}">
-                <a16:creationId xmlns:a16="http://schemas.microsoft.com/office/drawing/2014/main" id="{43F6F8B5-DE66-C53E-4FDD-A330FB6DA6A9}"/>
-              </a:ext>
-            </a:extLst>
-          </p:cNvPr>
+            <a:endParaRPr lang="en-US" dirty="0"/>
+          </a:p>
+        </p:txBody>
+      </p:sp>
+      <p:sp>
+        <p:nvSpPr>
+          <p:cNvPr id="7" name="Date Placeholder 6"/>
           <p:cNvSpPr>
             <a:spLocks noGrp="1"/>
           </p:cNvSpPr>
@@ -1849,13 +1630,7 @@
       </p:sp>
       <p:sp>
         <p:nvSpPr>
-          <p:cNvPr id="8" name="页脚占位符 7">
-            <a:extLst>
-              <a:ext uri="{FF2B5EF4-FFF2-40B4-BE49-F238E27FC236}">
-                <a16:creationId xmlns:a16="http://schemas.microsoft.com/office/drawing/2014/main" id="{4D63906B-9EFA-B211-1F50-FAF3FE0ADEF1}"/>
-              </a:ext>
-            </a:extLst>
-          </p:cNvPr>
+          <p:cNvPr id="8" name="Footer Placeholder 7"/>
           <p:cNvSpPr>
             <a:spLocks noGrp="1"/>
           </p:cNvSpPr>
@@ -1874,13 +1649,7 @@
       </p:sp>
       <p:sp>
         <p:nvSpPr>
-          <p:cNvPr id="9" name="灯片编号占位符 8">
-            <a:extLst>
-              <a:ext uri="{FF2B5EF4-FFF2-40B4-BE49-F238E27FC236}">
-                <a16:creationId xmlns:a16="http://schemas.microsoft.com/office/drawing/2014/main" id="{BC192F83-B607-0FC2-E379-B73EC68408AF}"/>
-              </a:ext>
-            </a:extLst>
-          </p:cNvPr>
+          <p:cNvPr id="9" name="Slide Number Placeholder 8"/>
           <p:cNvSpPr>
             <a:spLocks noGrp="1"/>
           </p:cNvSpPr>
@@ -1904,7 +1673,7 @@
     </p:spTree>
     <p:extLst>
       <p:ext uri="{BB962C8B-B14F-4D97-AF65-F5344CB8AC3E}">
-        <p14:creationId xmlns:p14="http://schemas.microsoft.com/office/powerpoint/2010/main" val="607479382"/>
+        <p14:creationId xmlns:p14="http://schemas.microsoft.com/office/powerpoint/2010/main" val="1732909016"/>
       </p:ext>
     </p:extLst>
   </p:cSld>
@@ -1933,13 +1702,7 @@
       </p:grpSpPr>
       <p:sp>
         <p:nvSpPr>
-          <p:cNvPr id="2" name="标题 1">
-            <a:extLst>
-              <a:ext uri="{FF2B5EF4-FFF2-40B4-BE49-F238E27FC236}">
-                <a16:creationId xmlns:a16="http://schemas.microsoft.com/office/drawing/2014/main" id="{22A0D2F5-B710-B568-CD97-F9261924D39E}"/>
-              </a:ext>
-            </a:extLst>
-          </p:cNvPr>
+          <p:cNvPr id="2" name="Title 1"/>
           <p:cNvSpPr>
             <a:spLocks noGrp="1"/>
           </p:cNvSpPr>
@@ -1956,19 +1719,13 @@
               <a:rPr lang="zh-CN" altLang="en-US"/>
               <a:t>单击此处编辑母版标题样式</a:t>
             </a:r>
-            <a:endParaRPr lang="en-GB"/>
-          </a:p>
-        </p:txBody>
-      </p:sp>
-      <p:sp>
-        <p:nvSpPr>
-          <p:cNvPr id="3" name="日期占位符 2">
-            <a:extLst>
-              <a:ext uri="{FF2B5EF4-FFF2-40B4-BE49-F238E27FC236}">
-                <a16:creationId xmlns:a16="http://schemas.microsoft.com/office/drawing/2014/main" id="{62F987FE-4733-D72A-232B-2B2C74B3ED55}"/>
-              </a:ext>
-            </a:extLst>
-          </p:cNvPr>
+            <a:endParaRPr lang="en-US" dirty="0"/>
+          </a:p>
+        </p:txBody>
+      </p:sp>
+      <p:sp>
+        <p:nvSpPr>
+          <p:cNvPr id="3" name="Date Placeholder 2"/>
           <p:cNvSpPr>
             <a:spLocks noGrp="1"/>
           </p:cNvSpPr>
@@ -1991,13 +1748,7 @@
       </p:sp>
       <p:sp>
         <p:nvSpPr>
-          <p:cNvPr id="4" name="页脚占位符 3">
-            <a:extLst>
-              <a:ext uri="{FF2B5EF4-FFF2-40B4-BE49-F238E27FC236}">
-                <a16:creationId xmlns:a16="http://schemas.microsoft.com/office/drawing/2014/main" id="{9E52BD14-7D44-C652-8952-86575A381820}"/>
-              </a:ext>
-            </a:extLst>
-          </p:cNvPr>
+          <p:cNvPr id="4" name="Footer Placeholder 3"/>
           <p:cNvSpPr>
             <a:spLocks noGrp="1"/>
           </p:cNvSpPr>
@@ -2016,13 +1767,7 @@
       </p:sp>
       <p:sp>
         <p:nvSpPr>
-          <p:cNvPr id="5" name="灯片编号占位符 4">
-            <a:extLst>
-              <a:ext uri="{FF2B5EF4-FFF2-40B4-BE49-F238E27FC236}">
-                <a16:creationId xmlns:a16="http://schemas.microsoft.com/office/drawing/2014/main" id="{F9FACD5B-2DAB-A89C-CD41-472B5EB5F056}"/>
-              </a:ext>
-            </a:extLst>
-          </p:cNvPr>
+          <p:cNvPr id="5" name="Slide Number Placeholder 4"/>
           <p:cNvSpPr>
             <a:spLocks noGrp="1"/>
           </p:cNvSpPr>
@@ -2046,7 +1791,7 @@
     </p:spTree>
     <p:extLst>
       <p:ext uri="{BB962C8B-B14F-4D97-AF65-F5344CB8AC3E}">
-        <p14:creationId xmlns:p14="http://schemas.microsoft.com/office/powerpoint/2010/main" val="3859265079"/>
+        <p14:creationId xmlns:p14="http://schemas.microsoft.com/office/powerpoint/2010/main" val="4089702706"/>
       </p:ext>
     </p:extLst>
   </p:cSld>
@@ -2075,13 +1820,7 @@
       </p:grpSpPr>
       <p:sp>
         <p:nvSpPr>
-          <p:cNvPr id="2" name="日期占位符 1">
-            <a:extLst>
-              <a:ext uri="{FF2B5EF4-FFF2-40B4-BE49-F238E27FC236}">
-                <a16:creationId xmlns:a16="http://schemas.microsoft.com/office/drawing/2014/main" id="{79E60AA0-BB62-90C4-C2AC-E13405281580}"/>
-              </a:ext>
-            </a:extLst>
-          </p:cNvPr>
+          <p:cNvPr id="2" name="Date Placeholder 1"/>
           <p:cNvSpPr>
             <a:spLocks noGrp="1"/>
           </p:cNvSpPr>
@@ -2104,13 +1843,7 @@
       </p:sp>
       <p:sp>
         <p:nvSpPr>
-          <p:cNvPr id="3" name="页脚占位符 2">
-            <a:extLst>
-              <a:ext uri="{FF2B5EF4-FFF2-40B4-BE49-F238E27FC236}">
-                <a16:creationId xmlns:a16="http://schemas.microsoft.com/office/drawing/2014/main" id="{0B6454AE-07F7-CFC6-FA8A-CEE86C2D97B5}"/>
-              </a:ext>
-            </a:extLst>
-          </p:cNvPr>
+          <p:cNvPr id="3" name="Footer Placeholder 2"/>
           <p:cNvSpPr>
             <a:spLocks noGrp="1"/>
           </p:cNvSpPr>
@@ -2129,13 +1862,7 @@
       </p:sp>
       <p:sp>
         <p:nvSpPr>
-          <p:cNvPr id="4" name="灯片编号占位符 3">
-            <a:extLst>
-              <a:ext uri="{FF2B5EF4-FFF2-40B4-BE49-F238E27FC236}">
-                <a16:creationId xmlns:a16="http://schemas.microsoft.com/office/drawing/2014/main" id="{D7B4CCA4-5E01-96D3-9435-F950C5CB7EB7}"/>
-              </a:ext>
-            </a:extLst>
-          </p:cNvPr>
+          <p:cNvPr id="4" name="Slide Number Placeholder 3"/>
           <p:cNvSpPr>
             <a:spLocks noGrp="1"/>
           </p:cNvSpPr>
@@ -2159,7 +1886,7 @@
     </p:spTree>
     <p:extLst>
       <p:ext uri="{BB962C8B-B14F-4D97-AF65-F5344CB8AC3E}">
-        <p14:creationId xmlns:p14="http://schemas.microsoft.com/office/powerpoint/2010/main" val="2711359414"/>
+        <p14:creationId xmlns:p14="http://schemas.microsoft.com/office/powerpoint/2010/main" val="3189376543"/>
       </p:ext>
     </p:extLst>
   </p:cSld>
@@ -2188,13 +1915,7 @@
       </p:grpSpPr>
       <p:sp>
         <p:nvSpPr>
-          <p:cNvPr id="2" name="标题 1">
-            <a:extLst>
-              <a:ext uri="{FF2B5EF4-FFF2-40B4-BE49-F238E27FC236}">
-                <a16:creationId xmlns:a16="http://schemas.microsoft.com/office/drawing/2014/main" id="{497113CC-9756-2F5B-8382-FFB9AF240792}"/>
-              </a:ext>
-            </a:extLst>
-          </p:cNvPr>
+          <p:cNvPr id="2" name="Title 1"/>
           <p:cNvSpPr>
             <a:spLocks noGrp="1"/>
           </p:cNvSpPr>
@@ -2204,15 +1925,15 @@
         </p:nvSpPr>
         <p:spPr>
           <a:xfrm>
-            <a:off x="839788" y="457200"/>
-            <a:ext cx="3932237" cy="1600200"/>
+            <a:off x="743891" y="240030"/>
+            <a:ext cx="3483204" cy="840105"/>
           </a:xfrm>
         </p:spPr>
         <p:txBody>
           <a:bodyPr anchor="b"/>
           <a:lstStyle>
             <a:lvl1pPr>
-              <a:defRPr sz="3200"/>
+              <a:defRPr sz="1680"/>
             </a:lvl1pPr>
           </a:lstStyle>
           <a:p>
@@ -2220,19 +1941,13 @@
               <a:rPr lang="zh-CN" altLang="en-US"/>
               <a:t>单击此处编辑母版标题样式</a:t>
             </a:r>
-            <a:endParaRPr lang="en-GB"/>
-          </a:p>
-        </p:txBody>
-      </p:sp>
-      <p:sp>
-        <p:nvSpPr>
-          <p:cNvPr id="3" name="内容占位符 2">
-            <a:extLst>
-              <a:ext uri="{FF2B5EF4-FFF2-40B4-BE49-F238E27FC236}">
-                <a16:creationId xmlns:a16="http://schemas.microsoft.com/office/drawing/2014/main" id="{E54A29E0-7B48-3D0A-CB48-FE3FD5EAF01B}"/>
-              </a:ext>
-            </a:extLst>
-          </p:cNvPr>
+            <a:endParaRPr lang="en-US" dirty="0"/>
+          </a:p>
+        </p:txBody>
+      </p:sp>
+      <p:sp>
+        <p:nvSpPr>
+          <p:cNvPr id="3" name="Content Placeholder 2"/>
           <p:cNvSpPr>
             <a:spLocks noGrp="1"/>
           </p:cNvSpPr>
@@ -2242,39 +1957,39 @@
         </p:nvSpPr>
         <p:spPr>
           <a:xfrm>
-            <a:off x="5183188" y="987425"/>
-            <a:ext cx="6172200" cy="4873625"/>
+            <a:off x="4591306" y="518398"/>
+            <a:ext cx="5467380" cy="2558653"/>
           </a:xfrm>
         </p:spPr>
         <p:txBody>
           <a:bodyPr/>
           <a:lstStyle>
             <a:lvl1pPr>
-              <a:defRPr sz="3200"/>
+              <a:defRPr sz="1680"/>
             </a:lvl1pPr>
             <a:lvl2pPr>
-              <a:defRPr sz="2800"/>
+              <a:defRPr sz="1470"/>
             </a:lvl2pPr>
             <a:lvl3pPr>
-              <a:defRPr sz="2400"/>
+              <a:defRPr sz="1260"/>
             </a:lvl3pPr>
             <a:lvl4pPr>
-              <a:defRPr sz="2000"/>
+              <a:defRPr sz="1050"/>
             </a:lvl4pPr>
             <a:lvl5pPr>
-              <a:defRPr sz="2000"/>
+              <a:defRPr sz="1050"/>
             </a:lvl5pPr>
             <a:lvl6pPr>
-              <a:defRPr sz="2000"/>
+              <a:defRPr sz="1050"/>
             </a:lvl6pPr>
             <a:lvl7pPr>
-              <a:defRPr sz="2000"/>
+              <a:defRPr sz="1050"/>
             </a:lvl7pPr>
             <a:lvl8pPr>
-              <a:defRPr sz="2000"/>
+              <a:defRPr sz="1050"/>
             </a:lvl8pPr>
             <a:lvl9pPr>
-              <a:defRPr sz="2000"/>
+              <a:defRPr sz="1050"/>
             </a:lvl9pPr>
           </a:lstStyle>
           <a:p>
@@ -2311,19 +2026,13 @@
               <a:rPr lang="zh-CN" altLang="en-US"/>
               <a:t>五级</a:t>
             </a:r>
-            <a:endParaRPr lang="en-GB"/>
-          </a:p>
-        </p:txBody>
-      </p:sp>
-      <p:sp>
-        <p:nvSpPr>
-          <p:cNvPr id="4" name="文本占位符 3">
-            <a:extLst>
-              <a:ext uri="{FF2B5EF4-FFF2-40B4-BE49-F238E27FC236}">
-                <a16:creationId xmlns:a16="http://schemas.microsoft.com/office/drawing/2014/main" id="{E69092E0-C791-AE0B-C6D5-A3D27AA86F77}"/>
-              </a:ext>
-            </a:extLst>
-          </p:cNvPr>
+            <a:endParaRPr lang="en-US" dirty="0"/>
+          </a:p>
+        </p:txBody>
+      </p:sp>
+      <p:sp>
+        <p:nvSpPr>
+          <p:cNvPr id="4" name="Text Placeholder 3"/>
           <p:cNvSpPr>
             <a:spLocks noGrp="1"/>
           </p:cNvSpPr>
@@ -2333,8 +2042,8 @@
         </p:nvSpPr>
         <p:spPr>
           <a:xfrm>
-            <a:off x="839788" y="2057400"/>
-            <a:ext cx="3932237" cy="3811588"/>
+            <a:off x="743891" y="1080135"/>
+            <a:ext cx="3483204" cy="2001084"/>
           </a:xfrm>
         </p:spPr>
         <p:txBody>
@@ -2342,39 +2051,39 @@
           <a:lstStyle>
             <a:lvl1pPr marL="0" indent="0">
               <a:buNone/>
-              <a:defRPr sz="1600"/>
+              <a:defRPr sz="840"/>
             </a:lvl1pPr>
-            <a:lvl2pPr marL="457200" indent="0">
-              <a:buNone/>
-              <a:defRPr sz="1400"/>
+            <a:lvl2pPr marL="240030" indent="0">
+              <a:buNone/>
+              <a:defRPr sz="735"/>
             </a:lvl2pPr>
-            <a:lvl3pPr marL="914400" indent="0">
-              <a:buNone/>
-              <a:defRPr sz="1200"/>
+            <a:lvl3pPr marL="480060" indent="0">
+              <a:buNone/>
+              <a:defRPr sz="630"/>
             </a:lvl3pPr>
-            <a:lvl4pPr marL="1371600" indent="0">
-              <a:buNone/>
-              <a:defRPr sz="1000"/>
+            <a:lvl4pPr marL="720090" indent="0">
+              <a:buNone/>
+              <a:defRPr sz="525"/>
             </a:lvl4pPr>
-            <a:lvl5pPr marL="1828800" indent="0">
-              <a:buNone/>
-              <a:defRPr sz="1000"/>
+            <a:lvl5pPr marL="960120" indent="0">
+              <a:buNone/>
+              <a:defRPr sz="525"/>
             </a:lvl5pPr>
-            <a:lvl6pPr marL="2286000" indent="0">
-              <a:buNone/>
-              <a:defRPr sz="1000"/>
+            <a:lvl6pPr marL="1200150" indent="0">
+              <a:buNone/>
+              <a:defRPr sz="525"/>
             </a:lvl6pPr>
-            <a:lvl7pPr marL="2743200" indent="0">
-              <a:buNone/>
-              <a:defRPr sz="1000"/>
+            <a:lvl7pPr marL="1440180" indent="0">
+              <a:buNone/>
+              <a:defRPr sz="525"/>
             </a:lvl7pPr>
-            <a:lvl8pPr marL="3200400" indent="0">
-              <a:buNone/>
-              <a:defRPr sz="1000"/>
+            <a:lvl8pPr marL="1680210" indent="0">
+              <a:buNone/>
+              <a:defRPr sz="525"/>
             </a:lvl8pPr>
-            <a:lvl9pPr marL="3657600" indent="0">
-              <a:buNone/>
-              <a:defRPr sz="1000"/>
+            <a:lvl9pPr marL="1920240" indent="0">
+              <a:buNone/>
+              <a:defRPr sz="525"/>
             </a:lvl9pPr>
           </a:lstStyle>
           <a:p>
@@ -2388,13 +2097,7 @@
       </p:sp>
       <p:sp>
         <p:nvSpPr>
-          <p:cNvPr id="5" name="日期占位符 4">
-            <a:extLst>
-              <a:ext uri="{FF2B5EF4-FFF2-40B4-BE49-F238E27FC236}">
-                <a16:creationId xmlns:a16="http://schemas.microsoft.com/office/drawing/2014/main" id="{A07E2330-0CCF-AF99-63D6-BC06AAC3F35E}"/>
-              </a:ext>
-            </a:extLst>
-          </p:cNvPr>
+          <p:cNvPr id="5" name="Date Placeholder 4"/>
           <p:cNvSpPr>
             <a:spLocks noGrp="1"/>
           </p:cNvSpPr>
@@ -2417,13 +2120,7 @@
       </p:sp>
       <p:sp>
         <p:nvSpPr>
-          <p:cNvPr id="6" name="页脚占位符 5">
-            <a:extLst>
-              <a:ext uri="{FF2B5EF4-FFF2-40B4-BE49-F238E27FC236}">
-                <a16:creationId xmlns:a16="http://schemas.microsoft.com/office/drawing/2014/main" id="{EC386E22-329F-60F4-E913-B5E2B3B46FA0}"/>
-              </a:ext>
-            </a:extLst>
-          </p:cNvPr>
+          <p:cNvPr id="6" name="Footer Placeholder 5"/>
           <p:cNvSpPr>
             <a:spLocks noGrp="1"/>
           </p:cNvSpPr>
@@ -2442,13 +2139,7 @@
       </p:sp>
       <p:sp>
         <p:nvSpPr>
-          <p:cNvPr id="7" name="灯片编号占位符 6">
-            <a:extLst>
-              <a:ext uri="{FF2B5EF4-FFF2-40B4-BE49-F238E27FC236}">
-                <a16:creationId xmlns:a16="http://schemas.microsoft.com/office/drawing/2014/main" id="{42848517-5468-1310-E177-2FB85F48A174}"/>
-              </a:ext>
-            </a:extLst>
-          </p:cNvPr>
+          <p:cNvPr id="7" name="Slide Number Placeholder 6"/>
           <p:cNvSpPr>
             <a:spLocks noGrp="1"/>
           </p:cNvSpPr>
@@ -2472,7 +2163,7 @@
     </p:spTree>
     <p:extLst>
       <p:ext uri="{BB962C8B-B14F-4D97-AF65-F5344CB8AC3E}">
-        <p14:creationId xmlns:p14="http://schemas.microsoft.com/office/powerpoint/2010/main" val="437044385"/>
+        <p14:creationId xmlns:p14="http://schemas.microsoft.com/office/powerpoint/2010/main" val="4079743151"/>
       </p:ext>
     </p:extLst>
   </p:cSld>
@@ -2501,13 +2192,7 @@
       </p:grpSpPr>
       <p:sp>
         <p:nvSpPr>
-          <p:cNvPr id="2" name="标题 1">
-            <a:extLst>
-              <a:ext uri="{FF2B5EF4-FFF2-40B4-BE49-F238E27FC236}">
-                <a16:creationId xmlns:a16="http://schemas.microsoft.com/office/drawing/2014/main" id="{BCB9FA42-AF8A-E4D0-BAEB-8D6F272431E8}"/>
-              </a:ext>
-            </a:extLst>
-          </p:cNvPr>
+          <p:cNvPr id="2" name="Title 1"/>
           <p:cNvSpPr>
             <a:spLocks noGrp="1"/>
           </p:cNvSpPr>
@@ -2517,15 +2202,15 @@
         </p:nvSpPr>
         <p:spPr>
           <a:xfrm>
-            <a:off x="839788" y="457200"/>
-            <a:ext cx="3932237" cy="1600200"/>
+            <a:off x="743891" y="240030"/>
+            <a:ext cx="3483204" cy="840105"/>
           </a:xfrm>
         </p:spPr>
         <p:txBody>
           <a:bodyPr anchor="b"/>
           <a:lstStyle>
             <a:lvl1pPr>
-              <a:defRPr sz="3200"/>
+              <a:defRPr sz="1680"/>
             </a:lvl1pPr>
           </a:lstStyle>
           <a:p>
@@ -2533,21 +2218,15 @@
               <a:rPr lang="zh-CN" altLang="en-US"/>
               <a:t>单击此处编辑母版标题样式</a:t>
             </a:r>
-            <a:endParaRPr lang="en-GB"/>
-          </a:p>
-        </p:txBody>
-      </p:sp>
-      <p:sp>
-        <p:nvSpPr>
-          <p:cNvPr id="3" name="图片占位符 2">
-            <a:extLst>
-              <a:ext uri="{FF2B5EF4-FFF2-40B4-BE49-F238E27FC236}">
-                <a16:creationId xmlns:a16="http://schemas.microsoft.com/office/drawing/2014/main" id="{38DD7951-913D-DF47-C4CF-8E12BEC998D5}"/>
-              </a:ext>
-            </a:extLst>
-          </p:cNvPr>
-          <p:cNvSpPr>
-            <a:spLocks noGrp="1"/>
+            <a:endParaRPr lang="en-US" dirty="0"/>
+          </a:p>
+        </p:txBody>
+      </p:sp>
+      <p:sp>
+        <p:nvSpPr>
+          <p:cNvPr id="3" name="Picture Placeholder 2"/>
+          <p:cNvSpPr>
+            <a:spLocks noGrp="1" noChangeAspect="1"/>
           </p:cNvSpPr>
           <p:nvPr>
             <p:ph type="pic" idx="1"/>
@@ -2555,64 +2234,62 @@
         </p:nvSpPr>
         <p:spPr>
           <a:xfrm>
-            <a:off x="5183188" y="987425"/>
-            <a:ext cx="6172200" cy="4873625"/>
+            <a:off x="4591306" y="518398"/>
+            <a:ext cx="5467380" cy="2558653"/>
           </a:xfrm>
         </p:spPr>
         <p:txBody>
-          <a:bodyPr/>
+          <a:bodyPr anchor="t"/>
           <a:lstStyle>
             <a:lvl1pPr marL="0" indent="0">
               <a:buNone/>
-              <a:defRPr sz="3200"/>
+              <a:defRPr sz="1680"/>
             </a:lvl1pPr>
-            <a:lvl2pPr marL="457200" indent="0">
-              <a:buNone/>
-              <a:defRPr sz="2800"/>
+            <a:lvl2pPr marL="240030" indent="0">
+              <a:buNone/>
+              <a:defRPr sz="1470"/>
             </a:lvl2pPr>
-            <a:lvl3pPr marL="914400" indent="0">
-              <a:buNone/>
-              <a:defRPr sz="2400"/>
+            <a:lvl3pPr marL="480060" indent="0">
+              <a:buNone/>
+              <a:defRPr sz="1260"/>
             </a:lvl3pPr>
-            <a:lvl4pPr marL="1371600" indent="0">
-              <a:buNone/>
-              <a:defRPr sz="2000"/>
+            <a:lvl4pPr marL="720090" indent="0">
+              <a:buNone/>
+              <a:defRPr sz="1050"/>
             </a:lvl4pPr>
-            <a:lvl5pPr marL="1828800" indent="0">
-              <a:buNone/>
-              <a:defRPr sz="2000"/>
+            <a:lvl5pPr marL="960120" indent="0">
+              <a:buNone/>
+              <a:defRPr sz="1050"/>
             </a:lvl5pPr>
-            <a:lvl6pPr marL="2286000" indent="0">
-              <a:buNone/>
-              <a:defRPr sz="2000"/>
+            <a:lvl6pPr marL="1200150" indent="0">
+              <a:buNone/>
+              <a:defRPr sz="1050"/>
             </a:lvl6pPr>
-            <a:lvl7pPr marL="2743200" indent="0">
-              <a:buNone/>
-              <a:defRPr sz="2000"/>
+            <a:lvl7pPr marL="1440180" indent="0">
+              <a:buNone/>
+              <a:defRPr sz="1050"/>
             </a:lvl7pPr>
-            <a:lvl8pPr marL="3200400" indent="0">
-              <a:buNone/>
-              <a:defRPr sz="2000"/>
+            <a:lvl8pPr marL="1680210" indent="0">
+              <a:buNone/>
+              <a:defRPr sz="1050"/>
             </a:lvl8pPr>
-            <a:lvl9pPr marL="3657600" indent="0">
-              <a:buNone/>
-              <a:defRPr sz="2000"/>
+            <a:lvl9pPr marL="1920240" indent="0">
+              <a:buNone/>
+              <a:defRPr sz="1050"/>
             </a:lvl9pPr>
           </a:lstStyle>
           <a:p>
-            <a:endParaRPr lang="en-GB"/>
-          </a:p>
-        </p:txBody>
-      </p:sp>
-      <p:sp>
-        <p:nvSpPr>
-          <p:cNvPr id="4" name="文本占位符 3">
-            <a:extLst>
-              <a:ext uri="{FF2B5EF4-FFF2-40B4-BE49-F238E27FC236}">
-                <a16:creationId xmlns:a16="http://schemas.microsoft.com/office/drawing/2014/main" id="{C5D97E6A-237E-866D-57B7-D385EDD610FF}"/>
-              </a:ext>
-            </a:extLst>
-          </p:cNvPr>
+            <a:r>
+              <a:rPr lang="zh-CN" altLang="en-US"/>
+              <a:t>单击图标添加图片</a:t>
+            </a:r>
+            <a:endParaRPr lang="en-US" dirty="0"/>
+          </a:p>
+        </p:txBody>
+      </p:sp>
+      <p:sp>
+        <p:nvSpPr>
+          <p:cNvPr id="4" name="Text Placeholder 3"/>
           <p:cNvSpPr>
             <a:spLocks noGrp="1"/>
           </p:cNvSpPr>
@@ -2622,8 +2299,8 @@
         </p:nvSpPr>
         <p:spPr>
           <a:xfrm>
-            <a:off x="839788" y="2057400"/>
-            <a:ext cx="3932237" cy="3811588"/>
+            <a:off x="743891" y="1080135"/>
+            <a:ext cx="3483204" cy="2001084"/>
           </a:xfrm>
         </p:spPr>
         <p:txBody>
@@ -2631,39 +2308,39 @@
           <a:lstStyle>
             <a:lvl1pPr marL="0" indent="0">
               <a:buNone/>
-              <a:defRPr sz="1600"/>
+              <a:defRPr sz="840"/>
             </a:lvl1pPr>
-            <a:lvl2pPr marL="457200" indent="0">
-              <a:buNone/>
-              <a:defRPr sz="1400"/>
+            <a:lvl2pPr marL="240030" indent="0">
+              <a:buNone/>
+              <a:defRPr sz="735"/>
             </a:lvl2pPr>
-            <a:lvl3pPr marL="914400" indent="0">
-              <a:buNone/>
-              <a:defRPr sz="1200"/>
+            <a:lvl3pPr marL="480060" indent="0">
+              <a:buNone/>
+              <a:defRPr sz="630"/>
             </a:lvl3pPr>
-            <a:lvl4pPr marL="1371600" indent="0">
-              <a:buNone/>
-              <a:defRPr sz="1000"/>
+            <a:lvl4pPr marL="720090" indent="0">
+              <a:buNone/>
+              <a:defRPr sz="525"/>
             </a:lvl4pPr>
-            <a:lvl5pPr marL="1828800" indent="0">
-              <a:buNone/>
-              <a:defRPr sz="1000"/>
+            <a:lvl5pPr marL="960120" indent="0">
+              <a:buNone/>
+              <a:defRPr sz="525"/>
             </a:lvl5pPr>
-            <a:lvl6pPr marL="2286000" indent="0">
-              <a:buNone/>
-              <a:defRPr sz="1000"/>
+            <a:lvl6pPr marL="1200150" indent="0">
+              <a:buNone/>
+              <a:defRPr sz="525"/>
             </a:lvl6pPr>
-            <a:lvl7pPr marL="2743200" indent="0">
-              <a:buNone/>
-              <a:defRPr sz="1000"/>
+            <a:lvl7pPr marL="1440180" indent="0">
+              <a:buNone/>
+              <a:defRPr sz="525"/>
             </a:lvl7pPr>
-            <a:lvl8pPr marL="3200400" indent="0">
-              <a:buNone/>
-              <a:defRPr sz="1000"/>
+            <a:lvl8pPr marL="1680210" indent="0">
+              <a:buNone/>
+              <a:defRPr sz="525"/>
             </a:lvl8pPr>
-            <a:lvl9pPr marL="3657600" indent="0">
-              <a:buNone/>
-              <a:defRPr sz="1000"/>
+            <a:lvl9pPr marL="1920240" indent="0">
+              <a:buNone/>
+              <a:defRPr sz="525"/>
             </a:lvl9pPr>
           </a:lstStyle>
           <a:p>
@@ -2677,13 +2354,7 @@
       </p:sp>
       <p:sp>
         <p:nvSpPr>
-          <p:cNvPr id="5" name="日期占位符 4">
-            <a:extLst>
-              <a:ext uri="{FF2B5EF4-FFF2-40B4-BE49-F238E27FC236}">
-                <a16:creationId xmlns:a16="http://schemas.microsoft.com/office/drawing/2014/main" id="{37C1F5EC-21B8-A967-094B-95F74DA93933}"/>
-              </a:ext>
-            </a:extLst>
-          </p:cNvPr>
+          <p:cNvPr id="5" name="Date Placeholder 4"/>
           <p:cNvSpPr>
             <a:spLocks noGrp="1"/>
           </p:cNvSpPr>
@@ -2706,13 +2377,7 @@
       </p:sp>
       <p:sp>
         <p:nvSpPr>
-          <p:cNvPr id="6" name="页脚占位符 5">
-            <a:extLst>
-              <a:ext uri="{FF2B5EF4-FFF2-40B4-BE49-F238E27FC236}">
-                <a16:creationId xmlns:a16="http://schemas.microsoft.com/office/drawing/2014/main" id="{A65134BF-1366-F7E4-D7E1-D90233B6B5FE}"/>
-              </a:ext>
-            </a:extLst>
-          </p:cNvPr>
+          <p:cNvPr id="6" name="Footer Placeholder 5"/>
           <p:cNvSpPr>
             <a:spLocks noGrp="1"/>
           </p:cNvSpPr>
@@ -2731,13 +2396,7 @@
       </p:sp>
       <p:sp>
         <p:nvSpPr>
-          <p:cNvPr id="7" name="灯片编号占位符 6">
-            <a:extLst>
-              <a:ext uri="{FF2B5EF4-FFF2-40B4-BE49-F238E27FC236}">
-                <a16:creationId xmlns:a16="http://schemas.microsoft.com/office/drawing/2014/main" id="{BA883F2B-6FEF-F2AA-A255-B8913E096A71}"/>
-              </a:ext>
-            </a:extLst>
-          </p:cNvPr>
+          <p:cNvPr id="7" name="Slide Number Placeholder 6"/>
           <p:cNvSpPr>
             <a:spLocks noGrp="1"/>
           </p:cNvSpPr>
@@ -2761,7 +2420,7 @@
     </p:spTree>
     <p:extLst>
       <p:ext uri="{BB962C8B-B14F-4D97-AF65-F5344CB8AC3E}">
-        <p14:creationId xmlns:p14="http://schemas.microsoft.com/office/powerpoint/2010/main" val="535649814"/>
+        <p14:creationId xmlns:p14="http://schemas.microsoft.com/office/powerpoint/2010/main" val="2414364975"/>
       </p:ext>
     </p:extLst>
   </p:cSld>
@@ -2795,13 +2454,7 @@
       </p:grpSpPr>
       <p:sp>
         <p:nvSpPr>
-          <p:cNvPr id="2" name="标题占位符 1">
-            <a:extLst>
-              <a:ext uri="{FF2B5EF4-FFF2-40B4-BE49-F238E27FC236}">
-                <a16:creationId xmlns:a16="http://schemas.microsoft.com/office/drawing/2014/main" id="{5A3F7B73-BE52-9CE8-6126-6370C76774D6}"/>
-              </a:ext>
-            </a:extLst>
-          </p:cNvPr>
+          <p:cNvPr id="2" name="Title Placeholder 1"/>
           <p:cNvSpPr>
             <a:spLocks noGrp="1"/>
           </p:cNvSpPr>
@@ -2811,8 +2464,8 @@
         </p:nvSpPr>
         <p:spPr>
           <a:xfrm>
-            <a:off x="838200" y="365125"/>
-            <a:ext cx="10515600" cy="1325563"/>
+            <a:off x="742484" y="191691"/>
+            <a:ext cx="9314796" cy="695921"/>
           </a:xfrm>
           <a:prstGeom prst="rect">
             <a:avLst/>
@@ -2828,19 +2481,13 @@
               <a:rPr lang="zh-CN" altLang="en-US"/>
               <a:t>单击此处编辑母版标题样式</a:t>
             </a:r>
-            <a:endParaRPr lang="en-GB"/>
-          </a:p>
-        </p:txBody>
-      </p:sp>
-      <p:sp>
-        <p:nvSpPr>
-          <p:cNvPr id="3" name="文本占位符 2">
-            <a:extLst>
-              <a:ext uri="{FF2B5EF4-FFF2-40B4-BE49-F238E27FC236}">
-                <a16:creationId xmlns:a16="http://schemas.microsoft.com/office/drawing/2014/main" id="{CBFD21C0-E7DE-AF60-2CC8-E2379A0A48B1}"/>
-              </a:ext>
-            </a:extLst>
-          </p:cNvPr>
+            <a:endParaRPr lang="en-US" dirty="0"/>
+          </a:p>
+        </p:txBody>
+      </p:sp>
+      <p:sp>
+        <p:nvSpPr>
+          <p:cNvPr id="3" name="Text Placeholder 2"/>
           <p:cNvSpPr>
             <a:spLocks noGrp="1"/>
           </p:cNvSpPr>
@@ -2850,8 +2497,8 @@
         </p:nvSpPr>
         <p:spPr>
           <a:xfrm>
-            <a:off x="838200" y="1825625"/>
-            <a:ext cx="10515600" cy="4351338"/>
+            <a:off x="742484" y="958453"/>
+            <a:ext cx="9314796" cy="2284452"/>
           </a:xfrm>
           <a:prstGeom prst="rect">
             <a:avLst/>
@@ -2896,19 +2543,13 @@
               <a:rPr lang="zh-CN" altLang="en-US"/>
               <a:t>五级</a:t>
             </a:r>
-            <a:endParaRPr lang="en-GB"/>
-          </a:p>
-        </p:txBody>
-      </p:sp>
-      <p:sp>
-        <p:nvSpPr>
-          <p:cNvPr id="4" name="日期占位符 3">
-            <a:extLst>
-              <a:ext uri="{FF2B5EF4-FFF2-40B4-BE49-F238E27FC236}">
-                <a16:creationId xmlns:a16="http://schemas.microsoft.com/office/drawing/2014/main" id="{76C693BD-462D-962D-267A-9E0A3C0C1EC4}"/>
-              </a:ext>
-            </a:extLst>
-          </p:cNvPr>
+            <a:endParaRPr lang="en-US" dirty="0"/>
+          </a:p>
+        </p:txBody>
+      </p:sp>
+      <p:sp>
+        <p:nvSpPr>
+          <p:cNvPr id="4" name="Date Placeholder 3"/>
           <p:cNvSpPr>
             <a:spLocks noGrp="1"/>
           </p:cNvSpPr>
@@ -2918,8 +2559,8 @@
         </p:nvSpPr>
         <p:spPr>
           <a:xfrm>
-            <a:off x="838200" y="6356350"/>
-            <a:ext cx="2743200" cy="365125"/>
+            <a:off x="742484" y="3337084"/>
+            <a:ext cx="2429947" cy="191691"/>
           </a:xfrm>
           <a:prstGeom prst="rect">
             <a:avLst/>
@@ -2929,7 +2570,7 @@
           <a:bodyPr vert="horz" lIns="91440" tIns="45720" rIns="91440" bIns="45720" rtlCol="0" anchor="ctr"/>
           <a:lstStyle>
             <a:lvl1pPr algn="l">
-              <a:defRPr sz="1200">
+              <a:defRPr sz="630">
                 <a:solidFill>
                   <a:schemeClr val="tx1">
                     <a:tint val="82000"/>
@@ -2949,13 +2590,7 @@
       </p:sp>
       <p:sp>
         <p:nvSpPr>
-          <p:cNvPr id="5" name="页脚占位符 4">
-            <a:extLst>
-              <a:ext uri="{FF2B5EF4-FFF2-40B4-BE49-F238E27FC236}">
-                <a16:creationId xmlns:a16="http://schemas.microsoft.com/office/drawing/2014/main" id="{AFD60AFE-0C93-F55B-5D11-FED949294036}"/>
-              </a:ext>
-            </a:extLst>
-          </p:cNvPr>
+          <p:cNvPr id="5" name="Footer Placeholder 4"/>
           <p:cNvSpPr>
             <a:spLocks noGrp="1"/>
           </p:cNvSpPr>
@@ -2965,8 +2600,8 @@
         </p:nvSpPr>
         <p:spPr>
           <a:xfrm>
-            <a:off x="4038600" y="6356350"/>
-            <a:ext cx="4114800" cy="365125"/>
+            <a:off x="3577422" y="3337084"/>
+            <a:ext cx="3644920" cy="191691"/>
           </a:xfrm>
           <a:prstGeom prst="rect">
             <a:avLst/>
@@ -2976,7 +2611,7 @@
           <a:bodyPr vert="horz" lIns="91440" tIns="45720" rIns="91440" bIns="45720" rtlCol="0" anchor="ctr"/>
           <a:lstStyle>
             <a:lvl1pPr algn="ctr">
-              <a:defRPr sz="1200">
+              <a:defRPr sz="630">
                 <a:solidFill>
                   <a:schemeClr val="tx1">
                     <a:tint val="82000"/>
@@ -2992,13 +2627,7 @@
       </p:sp>
       <p:sp>
         <p:nvSpPr>
-          <p:cNvPr id="6" name="灯片编号占位符 5">
-            <a:extLst>
-              <a:ext uri="{FF2B5EF4-FFF2-40B4-BE49-F238E27FC236}">
-                <a16:creationId xmlns:a16="http://schemas.microsoft.com/office/drawing/2014/main" id="{097780F9-12C1-C486-1456-06277473700B}"/>
-              </a:ext>
-            </a:extLst>
-          </p:cNvPr>
+          <p:cNvPr id="6" name="Slide Number Placeholder 5"/>
           <p:cNvSpPr>
             <a:spLocks noGrp="1"/>
           </p:cNvSpPr>
@@ -3008,8 +2637,8 @@
         </p:nvSpPr>
         <p:spPr>
           <a:xfrm>
-            <a:off x="8610600" y="6356350"/>
-            <a:ext cx="2743200" cy="365125"/>
+            <a:off x="7627332" y="3337084"/>
+            <a:ext cx="2429947" cy="191691"/>
           </a:xfrm>
           <a:prstGeom prst="rect">
             <a:avLst/>
@@ -3019,7 +2648,7 @@
           <a:bodyPr vert="horz" lIns="91440" tIns="45720" rIns="91440" bIns="45720" rtlCol="0" anchor="ctr"/>
           <a:lstStyle>
             <a:lvl1pPr algn="r">
-              <a:defRPr sz="1200">
+              <a:defRPr sz="630">
                 <a:solidFill>
                   <a:schemeClr val="tx1">
                     <a:tint val="82000"/>
@@ -3040,27 +2669,27 @@
     </p:spTree>
     <p:extLst>
       <p:ext uri="{BB962C8B-B14F-4D97-AF65-F5344CB8AC3E}">
-        <p14:creationId xmlns:p14="http://schemas.microsoft.com/office/powerpoint/2010/main" val="2031542389"/>
+        <p14:creationId xmlns:p14="http://schemas.microsoft.com/office/powerpoint/2010/main" val="374679394"/>
       </p:ext>
     </p:extLst>
   </p:cSld>
   <p:clrMap bg1="lt1" tx1="dk1" bg2="lt2" tx2="dk2" accent1="accent1" accent2="accent2" accent3="accent3" accent4="accent4" accent5="accent5" accent6="accent6" hlink="hlink" folHlink="folHlink"/>
   <p:sldLayoutIdLst>
-    <p:sldLayoutId id="2147483649" r:id="rId1"/>
-    <p:sldLayoutId id="2147483650" r:id="rId2"/>
-    <p:sldLayoutId id="2147483651" r:id="rId3"/>
-    <p:sldLayoutId id="2147483652" r:id="rId4"/>
-    <p:sldLayoutId id="2147483653" r:id="rId5"/>
-    <p:sldLayoutId id="2147483654" r:id="rId6"/>
-    <p:sldLayoutId id="2147483655" r:id="rId7"/>
-    <p:sldLayoutId id="2147483656" r:id="rId8"/>
-    <p:sldLayoutId id="2147483657" r:id="rId9"/>
-    <p:sldLayoutId id="2147483658" r:id="rId10"/>
-    <p:sldLayoutId id="2147483659" r:id="rId11"/>
+    <p:sldLayoutId id="2147483673" r:id="rId1"/>
+    <p:sldLayoutId id="2147483674" r:id="rId2"/>
+    <p:sldLayoutId id="2147483675" r:id="rId3"/>
+    <p:sldLayoutId id="2147483676" r:id="rId4"/>
+    <p:sldLayoutId id="2147483677" r:id="rId5"/>
+    <p:sldLayoutId id="2147483678" r:id="rId6"/>
+    <p:sldLayoutId id="2147483679" r:id="rId7"/>
+    <p:sldLayoutId id="2147483680" r:id="rId8"/>
+    <p:sldLayoutId id="2147483681" r:id="rId9"/>
+    <p:sldLayoutId id="2147483682" r:id="rId10"/>
+    <p:sldLayoutId id="2147483683" r:id="rId11"/>
   </p:sldLayoutIdLst>
   <p:txStyles>
     <p:titleStyle>
-      <a:lvl1pPr algn="l" defTabSz="914400" rtl="0" eaLnBrk="1" latinLnBrk="0" hangingPunct="1">
+      <a:lvl1pPr algn="l" defTabSz="480060" rtl="0" eaLnBrk="1" latinLnBrk="0" hangingPunct="1">
         <a:lnSpc>
           <a:spcPct val="90000"/>
         </a:lnSpc>
@@ -3068,7 +2697,7 @@
           <a:spcPct val="0"/>
         </a:spcBef>
         <a:buNone/>
-        <a:defRPr sz="4400" kern="1200">
+        <a:defRPr sz="2310" kern="1200">
           <a:solidFill>
             <a:schemeClr val="tx1"/>
           </a:solidFill>
@@ -3079,16 +2708,16 @@
       </a:lvl1pPr>
     </p:titleStyle>
     <p:bodyStyle>
-      <a:lvl1pPr marL="228600" indent="-228600" algn="l" defTabSz="914400" rtl="0" eaLnBrk="1" latinLnBrk="0" hangingPunct="1">
+      <a:lvl1pPr marL="120015" indent="-120015" algn="l" defTabSz="480060" rtl="0" eaLnBrk="1" latinLnBrk="0" hangingPunct="1">
         <a:lnSpc>
           <a:spcPct val="90000"/>
         </a:lnSpc>
         <a:spcBef>
-          <a:spcPts val="1000"/>
+          <a:spcPts val="525"/>
         </a:spcBef>
         <a:buFont typeface="Arial" panose="020B0604020202020204" pitchFamily="34" charset="0"/>
         <a:buChar char="•"/>
-        <a:defRPr sz="2800" kern="1200">
+        <a:defRPr sz="1470" kern="1200">
           <a:solidFill>
             <a:schemeClr val="tx1"/>
           </a:solidFill>
@@ -3097,16 +2726,16 @@
           <a:cs typeface="+mn-cs"/>
         </a:defRPr>
       </a:lvl1pPr>
-      <a:lvl2pPr marL="685800" indent="-228600" algn="l" defTabSz="914400" rtl="0" eaLnBrk="1" latinLnBrk="0" hangingPunct="1">
+      <a:lvl2pPr marL="360045" indent="-120015" algn="l" defTabSz="480060" rtl="0" eaLnBrk="1" latinLnBrk="0" hangingPunct="1">
         <a:lnSpc>
           <a:spcPct val="90000"/>
         </a:lnSpc>
         <a:spcBef>
-          <a:spcPts val="500"/>
+          <a:spcPts val="263"/>
         </a:spcBef>
         <a:buFont typeface="Arial" panose="020B0604020202020204" pitchFamily="34" charset="0"/>
         <a:buChar char="•"/>
-        <a:defRPr sz="2400" kern="1200">
+        <a:defRPr sz="1260" kern="1200">
           <a:solidFill>
             <a:schemeClr val="tx1"/>
           </a:solidFill>
@@ -3115,16 +2744,16 @@
           <a:cs typeface="+mn-cs"/>
         </a:defRPr>
       </a:lvl2pPr>
-      <a:lvl3pPr marL="1143000" indent="-228600" algn="l" defTabSz="914400" rtl="0" eaLnBrk="1" latinLnBrk="0" hangingPunct="1">
+      <a:lvl3pPr marL="600075" indent="-120015" algn="l" defTabSz="480060" rtl="0" eaLnBrk="1" latinLnBrk="0" hangingPunct="1">
         <a:lnSpc>
           <a:spcPct val="90000"/>
         </a:lnSpc>
         <a:spcBef>
-          <a:spcPts val="500"/>
+          <a:spcPts val="263"/>
         </a:spcBef>
         <a:buFont typeface="Arial" panose="020B0604020202020204" pitchFamily="34" charset="0"/>
         <a:buChar char="•"/>
-        <a:defRPr sz="2000" kern="1200">
+        <a:defRPr sz="1050" kern="1200">
           <a:solidFill>
             <a:schemeClr val="tx1"/>
           </a:solidFill>
@@ -3133,16 +2762,16 @@
           <a:cs typeface="+mn-cs"/>
         </a:defRPr>
       </a:lvl3pPr>
-      <a:lvl4pPr marL="1600200" indent="-228600" algn="l" defTabSz="914400" rtl="0" eaLnBrk="1" latinLnBrk="0" hangingPunct="1">
+      <a:lvl4pPr marL="840105" indent="-120015" algn="l" defTabSz="480060" rtl="0" eaLnBrk="1" latinLnBrk="0" hangingPunct="1">
         <a:lnSpc>
           <a:spcPct val="90000"/>
         </a:lnSpc>
         <a:spcBef>
-          <a:spcPts val="500"/>
+          <a:spcPts val="263"/>
         </a:spcBef>
         <a:buFont typeface="Arial" panose="020B0604020202020204" pitchFamily="34" charset="0"/>
         <a:buChar char="•"/>
-        <a:defRPr sz="1800" kern="1200">
+        <a:defRPr sz="945" kern="1200">
           <a:solidFill>
             <a:schemeClr val="tx1"/>
           </a:solidFill>
@@ -3151,16 +2780,16 @@
           <a:cs typeface="+mn-cs"/>
         </a:defRPr>
       </a:lvl4pPr>
-      <a:lvl5pPr marL="2057400" indent="-228600" algn="l" defTabSz="914400" rtl="0" eaLnBrk="1" latinLnBrk="0" hangingPunct="1">
+      <a:lvl5pPr marL="1080135" indent="-120015" algn="l" defTabSz="480060" rtl="0" eaLnBrk="1" latinLnBrk="0" hangingPunct="1">
         <a:lnSpc>
           <a:spcPct val="90000"/>
         </a:lnSpc>
         <a:spcBef>
-          <a:spcPts val="500"/>
+          <a:spcPts val="263"/>
         </a:spcBef>
         <a:buFont typeface="Arial" panose="020B0604020202020204" pitchFamily="34" charset="0"/>
         <a:buChar char="•"/>
-        <a:defRPr sz="1800" kern="1200">
+        <a:defRPr sz="945" kern="1200">
           <a:solidFill>
             <a:schemeClr val="tx1"/>
           </a:solidFill>
@@ -3169,16 +2798,16 @@
           <a:cs typeface="+mn-cs"/>
         </a:defRPr>
       </a:lvl5pPr>
-      <a:lvl6pPr marL="2514600" indent="-228600" algn="l" defTabSz="914400" rtl="0" eaLnBrk="1" latinLnBrk="0" hangingPunct="1">
+      <a:lvl6pPr marL="1320165" indent="-120015" algn="l" defTabSz="480060" rtl="0" eaLnBrk="1" latinLnBrk="0" hangingPunct="1">
         <a:lnSpc>
           <a:spcPct val="90000"/>
         </a:lnSpc>
         <a:spcBef>
-          <a:spcPts val="500"/>
+          <a:spcPts val="263"/>
         </a:spcBef>
         <a:buFont typeface="Arial" panose="020B0604020202020204" pitchFamily="34" charset="0"/>
         <a:buChar char="•"/>
-        <a:defRPr sz="1800" kern="1200">
+        <a:defRPr sz="945" kern="1200">
           <a:solidFill>
             <a:schemeClr val="tx1"/>
           </a:solidFill>
@@ -3187,16 +2816,16 @@
           <a:cs typeface="+mn-cs"/>
         </a:defRPr>
       </a:lvl6pPr>
-      <a:lvl7pPr marL="2971800" indent="-228600" algn="l" defTabSz="914400" rtl="0" eaLnBrk="1" latinLnBrk="0" hangingPunct="1">
+      <a:lvl7pPr marL="1560195" indent="-120015" algn="l" defTabSz="480060" rtl="0" eaLnBrk="1" latinLnBrk="0" hangingPunct="1">
         <a:lnSpc>
           <a:spcPct val="90000"/>
         </a:lnSpc>
         <a:spcBef>
-          <a:spcPts val="500"/>
+          <a:spcPts val="263"/>
         </a:spcBef>
         <a:buFont typeface="Arial" panose="020B0604020202020204" pitchFamily="34" charset="0"/>
         <a:buChar char="•"/>
-        <a:defRPr sz="1800" kern="1200">
+        <a:defRPr sz="945" kern="1200">
           <a:solidFill>
             <a:schemeClr val="tx1"/>
           </a:solidFill>
@@ -3205,16 +2834,16 @@
           <a:cs typeface="+mn-cs"/>
         </a:defRPr>
       </a:lvl7pPr>
-      <a:lvl8pPr marL="3429000" indent="-228600" algn="l" defTabSz="914400" rtl="0" eaLnBrk="1" latinLnBrk="0" hangingPunct="1">
+      <a:lvl8pPr marL="1800225" indent="-120015" algn="l" defTabSz="480060" rtl="0" eaLnBrk="1" latinLnBrk="0" hangingPunct="1">
         <a:lnSpc>
           <a:spcPct val="90000"/>
         </a:lnSpc>
         <a:spcBef>
-          <a:spcPts val="500"/>
+          <a:spcPts val="263"/>
         </a:spcBef>
         <a:buFont typeface="Arial" panose="020B0604020202020204" pitchFamily="34" charset="0"/>
         <a:buChar char="•"/>
-        <a:defRPr sz="1800" kern="1200">
+        <a:defRPr sz="945" kern="1200">
           <a:solidFill>
             <a:schemeClr val="tx1"/>
           </a:solidFill>
@@ -3223,16 +2852,16 @@
           <a:cs typeface="+mn-cs"/>
         </a:defRPr>
       </a:lvl8pPr>
-      <a:lvl9pPr marL="3886200" indent="-228600" algn="l" defTabSz="914400" rtl="0" eaLnBrk="1" latinLnBrk="0" hangingPunct="1">
+      <a:lvl9pPr marL="2040255" indent="-120015" algn="l" defTabSz="480060" rtl="0" eaLnBrk="1" latinLnBrk="0" hangingPunct="1">
         <a:lnSpc>
           <a:spcPct val="90000"/>
         </a:lnSpc>
         <a:spcBef>
-          <a:spcPts val="500"/>
+          <a:spcPts val="263"/>
         </a:spcBef>
         <a:buFont typeface="Arial" panose="020B0604020202020204" pitchFamily="34" charset="0"/>
         <a:buChar char="•"/>
-        <a:defRPr sz="1800" kern="1200">
+        <a:defRPr sz="945" kern="1200">
           <a:solidFill>
             <a:schemeClr val="tx1"/>
           </a:solidFill>
@@ -3244,10 +2873,10 @@
     </p:bodyStyle>
     <p:otherStyle>
       <a:defPPr>
-        <a:defRPr lang="zh-CN"/>
+        <a:defRPr lang="en-US"/>
       </a:defPPr>
-      <a:lvl1pPr marL="0" algn="l" defTabSz="914400" rtl="0" eaLnBrk="1" latinLnBrk="0" hangingPunct="1">
-        <a:defRPr sz="1800" kern="1200">
+      <a:lvl1pPr marL="0" algn="l" defTabSz="480060" rtl="0" eaLnBrk="1" latinLnBrk="0" hangingPunct="1">
+        <a:defRPr sz="945" kern="1200">
           <a:solidFill>
             <a:schemeClr val="tx1"/>
           </a:solidFill>
@@ -3256,8 +2885,8 @@
           <a:cs typeface="+mn-cs"/>
         </a:defRPr>
       </a:lvl1pPr>
-      <a:lvl2pPr marL="457200" algn="l" defTabSz="914400" rtl="0" eaLnBrk="1" latinLnBrk="0" hangingPunct="1">
-        <a:defRPr sz="1800" kern="1200">
+      <a:lvl2pPr marL="240030" algn="l" defTabSz="480060" rtl="0" eaLnBrk="1" latinLnBrk="0" hangingPunct="1">
+        <a:defRPr sz="945" kern="1200">
           <a:solidFill>
             <a:schemeClr val="tx1"/>
           </a:solidFill>
@@ -3266,8 +2895,8 @@
           <a:cs typeface="+mn-cs"/>
         </a:defRPr>
       </a:lvl2pPr>
-      <a:lvl3pPr marL="914400" algn="l" defTabSz="914400" rtl="0" eaLnBrk="1" latinLnBrk="0" hangingPunct="1">
-        <a:defRPr sz="1800" kern="1200">
+      <a:lvl3pPr marL="480060" algn="l" defTabSz="480060" rtl="0" eaLnBrk="1" latinLnBrk="0" hangingPunct="1">
+        <a:defRPr sz="945" kern="1200">
           <a:solidFill>
             <a:schemeClr val="tx1"/>
           </a:solidFill>
@@ -3276,8 +2905,8 @@
           <a:cs typeface="+mn-cs"/>
         </a:defRPr>
       </a:lvl3pPr>
-      <a:lvl4pPr marL="1371600" algn="l" defTabSz="914400" rtl="0" eaLnBrk="1" latinLnBrk="0" hangingPunct="1">
-        <a:defRPr sz="1800" kern="1200">
+      <a:lvl4pPr marL="720090" algn="l" defTabSz="480060" rtl="0" eaLnBrk="1" latinLnBrk="0" hangingPunct="1">
+        <a:defRPr sz="945" kern="1200">
           <a:solidFill>
             <a:schemeClr val="tx1"/>
           </a:solidFill>
@@ -3286,8 +2915,8 @@
           <a:cs typeface="+mn-cs"/>
         </a:defRPr>
       </a:lvl4pPr>
-      <a:lvl5pPr marL="1828800" algn="l" defTabSz="914400" rtl="0" eaLnBrk="1" latinLnBrk="0" hangingPunct="1">
-        <a:defRPr sz="1800" kern="1200">
+      <a:lvl5pPr marL="960120" algn="l" defTabSz="480060" rtl="0" eaLnBrk="1" latinLnBrk="0" hangingPunct="1">
+        <a:defRPr sz="945" kern="1200">
           <a:solidFill>
             <a:schemeClr val="tx1"/>
           </a:solidFill>
@@ -3296,8 +2925,8 @@
           <a:cs typeface="+mn-cs"/>
         </a:defRPr>
       </a:lvl5pPr>
-      <a:lvl6pPr marL="2286000" algn="l" defTabSz="914400" rtl="0" eaLnBrk="1" latinLnBrk="0" hangingPunct="1">
-        <a:defRPr sz="1800" kern="1200">
+      <a:lvl6pPr marL="1200150" algn="l" defTabSz="480060" rtl="0" eaLnBrk="1" latinLnBrk="0" hangingPunct="1">
+        <a:defRPr sz="945" kern="1200">
           <a:solidFill>
             <a:schemeClr val="tx1"/>
           </a:solidFill>
@@ -3306,8 +2935,8 @@
           <a:cs typeface="+mn-cs"/>
         </a:defRPr>
       </a:lvl6pPr>
-      <a:lvl7pPr marL="2743200" algn="l" defTabSz="914400" rtl="0" eaLnBrk="1" latinLnBrk="0" hangingPunct="1">
-        <a:defRPr sz="1800" kern="1200">
+      <a:lvl7pPr marL="1440180" algn="l" defTabSz="480060" rtl="0" eaLnBrk="1" latinLnBrk="0" hangingPunct="1">
+        <a:defRPr sz="945" kern="1200">
           <a:solidFill>
             <a:schemeClr val="tx1"/>
           </a:solidFill>
@@ -3316,8 +2945,8 @@
           <a:cs typeface="+mn-cs"/>
         </a:defRPr>
       </a:lvl7pPr>
-      <a:lvl8pPr marL="3200400" algn="l" defTabSz="914400" rtl="0" eaLnBrk="1" latinLnBrk="0" hangingPunct="1">
-        <a:defRPr sz="1800" kern="1200">
+      <a:lvl8pPr marL="1680210" algn="l" defTabSz="480060" rtl="0" eaLnBrk="1" latinLnBrk="0" hangingPunct="1">
+        <a:defRPr sz="945" kern="1200">
           <a:solidFill>
             <a:schemeClr val="tx1"/>
           </a:solidFill>
@@ -3326,8 +2955,8 @@
           <a:cs typeface="+mn-cs"/>
         </a:defRPr>
       </a:lvl8pPr>
-      <a:lvl9pPr marL="3657600" algn="l" defTabSz="914400" rtl="0" eaLnBrk="1" latinLnBrk="0" hangingPunct="1">
-        <a:defRPr sz="1800" kern="1200">
+      <a:lvl9pPr marL="1920240" algn="l" defTabSz="480060" rtl="0" eaLnBrk="1" latinLnBrk="0" hangingPunct="1">
+        <a:defRPr sz="945" kern="1200">
           <a:solidFill>
             <a:schemeClr val="tx1"/>
           </a:solidFill>
@@ -3385,43 +3014,8 @@
         </p:blipFill>
         <p:spPr>
           <a:xfrm>
-            <a:off x="1272121" y="370114"/>
-            <a:ext cx="9647758" cy="6117772"/>
-          </a:xfrm>
-          <a:prstGeom prst="rect">
-            <a:avLst/>
-          </a:prstGeom>
-        </p:spPr>
-      </p:pic>
-      <p:pic>
-        <p:nvPicPr>
-          <p:cNvPr id="9" name="图片 8" descr="图示&#10;&#10;描述已自动生成">
-            <a:extLst>
-              <a:ext uri="{FF2B5EF4-FFF2-40B4-BE49-F238E27FC236}">
-                <a16:creationId xmlns:a16="http://schemas.microsoft.com/office/drawing/2014/main" id="{C58E6609-D4B1-8B4C-364B-0C1AEAB05C99}"/>
-              </a:ext>
-            </a:extLst>
-          </p:cNvPr>
-          <p:cNvPicPr>
-            <a:picLocks noChangeAspect="1"/>
-          </p:cNvPicPr>
-          <p:nvPr/>
-        </p:nvPicPr>
-        <p:blipFill>
-          <a:blip r:embed="rId3">
-            <a:extLst>
-              <a:ext uri="{28A0092B-C50C-407E-A947-70E740481C1C}">
-                <a14:useLocalDpi xmlns:a14="http://schemas.microsoft.com/office/drawing/2010/main" val="0"/>
-              </a:ext>
-            </a:extLst>
-          </a:blip>
-          <a:srcRect l="1074" t="7716" r="54723"/>
-          <a:stretch/>
-        </p:blipFill>
-        <p:spPr>
-          <a:xfrm>
-            <a:off x="-2154935" y="3062288"/>
-            <a:ext cx="1231348" cy="1446033"/>
+            <a:off x="2560920" y="2"/>
+            <a:ext cx="5677922" cy="3600448"/>
           </a:xfrm>
           <a:prstGeom prst="rect">
             <a:avLst/>
@@ -3441,10 +3035,252 @@
 </p:sld>
 </file>
 
+<file path=ppt/slides/slide2.xml><?xml version="1.0" encoding="utf-8"?>
+<p:sld xmlns:a="http://schemas.openxmlformats.org/drawingml/2006/main" xmlns:r="http://schemas.openxmlformats.org/officeDocument/2006/relationships" xmlns:p="http://schemas.openxmlformats.org/presentationml/2006/main">
+  <p:cSld>
+    <p:spTree>
+      <p:nvGrpSpPr>
+        <p:cNvPr id="1" name=""/>
+        <p:cNvGrpSpPr/>
+        <p:nvPr/>
+      </p:nvGrpSpPr>
+      <p:grpSpPr>
+        <a:xfrm>
+          <a:off x="0" y="0"/>
+          <a:ext cx="0" cy="0"/>
+          <a:chOff x="0" y="0"/>
+          <a:chExt cx="0" cy="0"/>
+        </a:xfrm>
+      </p:grpSpPr>
+      <p:pic>
+        <p:nvPicPr>
+          <p:cNvPr id="2" name="图片 1" descr="图示&#10;&#10;描述已自动生成">
+            <a:extLst>
+              <a:ext uri="{FF2B5EF4-FFF2-40B4-BE49-F238E27FC236}">
+                <a16:creationId xmlns:a16="http://schemas.microsoft.com/office/drawing/2014/main" id="{CFC068E9-2FCD-8B7C-EB82-E0F781648056}"/>
+              </a:ext>
+            </a:extLst>
+          </p:cNvPr>
+          <p:cNvPicPr>
+            <a:picLocks noChangeAspect="1"/>
+          </p:cNvPicPr>
+          <p:nvPr/>
+        </p:nvPicPr>
+        <p:blipFill>
+          <a:blip r:embed="rId2">
+            <a:extLst>
+              <a:ext uri="{28A0092B-C50C-407E-A947-70E740481C1C}">
+                <a14:useLocalDpi xmlns:a14="http://schemas.microsoft.com/office/drawing/2010/main" val="0"/>
+              </a:ext>
+            </a:extLst>
+          </a:blip>
+          <a:srcRect l="11493" t="13720" r="63323" b="57913"/>
+          <a:stretch/>
+        </p:blipFill>
+        <p:spPr>
+          <a:xfrm>
+            <a:off x="304800" y="503218"/>
+            <a:ext cx="4093954" cy="2594016"/>
+          </a:xfrm>
+          <a:prstGeom prst="rect">
+            <a:avLst/>
+          </a:prstGeom>
+        </p:spPr>
+      </p:pic>
+      <p:pic>
+        <p:nvPicPr>
+          <p:cNvPr id="3" name="图片 2" descr="图示&#10;&#10;描述已自动生成">
+            <a:extLst>
+              <a:ext uri="{FF2B5EF4-FFF2-40B4-BE49-F238E27FC236}">
+                <a16:creationId xmlns:a16="http://schemas.microsoft.com/office/drawing/2014/main" id="{88A5C2AB-BE9D-D0EE-D36D-CE44DD3732FA}"/>
+              </a:ext>
+            </a:extLst>
+          </p:cNvPr>
+          <p:cNvPicPr>
+            <a:picLocks noChangeAspect="1"/>
+          </p:cNvPicPr>
+          <p:nvPr/>
+        </p:nvPicPr>
+        <p:blipFill>
+          <a:blip r:embed="rId2">
+            <a:extLst>
+              <a:ext uri="{28A0092B-C50C-407E-A947-70E740481C1C}">
+                <a14:useLocalDpi xmlns:a14="http://schemas.microsoft.com/office/drawing/2010/main" val="0"/>
+              </a:ext>
+            </a:extLst>
+          </a:blip>
+          <a:srcRect l="6927" t="50767" r="56111" b="15873"/>
+          <a:stretch/>
+        </p:blipFill>
+        <p:spPr>
+          <a:xfrm>
+            <a:off x="4801429" y="51854"/>
+            <a:ext cx="5998334" cy="3045380"/>
+          </a:xfrm>
+          <a:prstGeom prst="rect">
+            <a:avLst/>
+          </a:prstGeom>
+        </p:spPr>
+      </p:pic>
+    </p:spTree>
+    <p:extLst>
+      <p:ext uri="{BB962C8B-B14F-4D97-AF65-F5344CB8AC3E}">
+        <p14:creationId xmlns:p14="http://schemas.microsoft.com/office/powerpoint/2010/main" val="3522631444"/>
+      </p:ext>
+    </p:extLst>
+  </p:cSld>
+  <p:clrMapOvr>
+    <a:masterClrMapping/>
+  </p:clrMapOvr>
+</p:sld>
+</file>
+
+<file path=ppt/slides/slide3.xml><?xml version="1.0" encoding="utf-8"?>
+<p:sld xmlns:a="http://schemas.openxmlformats.org/drawingml/2006/main" xmlns:r="http://schemas.openxmlformats.org/officeDocument/2006/relationships" xmlns:p="http://schemas.openxmlformats.org/presentationml/2006/main">
+  <p:cSld>
+    <p:spTree>
+      <p:nvGrpSpPr>
+        <p:cNvPr id="1" name="">
+          <a:extLst>
+            <a:ext uri="{FF2B5EF4-FFF2-40B4-BE49-F238E27FC236}">
+              <a16:creationId xmlns:a16="http://schemas.microsoft.com/office/drawing/2014/main" id="{E311C339-C6F1-104A-5539-7A9259BCF577}"/>
+            </a:ext>
+          </a:extLst>
+        </p:cNvPr>
+        <p:cNvGrpSpPr/>
+        <p:nvPr/>
+      </p:nvGrpSpPr>
+      <p:grpSpPr>
+        <a:xfrm>
+          <a:off x="0" y="0"/>
+          <a:ext cx="0" cy="0"/>
+          <a:chOff x="0" y="0"/>
+          <a:chExt cx="0" cy="0"/>
+        </a:xfrm>
+      </p:grpSpPr>
+      <p:pic>
+        <p:nvPicPr>
+          <p:cNvPr id="2" name="图片 1" descr="图示&#10;&#10;描述已自动生成">
+            <a:extLst>
+              <a:ext uri="{FF2B5EF4-FFF2-40B4-BE49-F238E27FC236}">
+                <a16:creationId xmlns:a16="http://schemas.microsoft.com/office/drawing/2014/main" id="{EE4CE4C1-780F-36A7-3B1D-5CFB5A90E651}"/>
+              </a:ext>
+            </a:extLst>
+          </p:cNvPr>
+          <p:cNvPicPr>
+            <a:picLocks noChangeAspect="1"/>
+          </p:cNvPicPr>
+          <p:nvPr/>
+        </p:nvPicPr>
+        <p:blipFill>
+          <a:blip r:embed="rId2">
+            <a:extLst>
+              <a:ext uri="{28A0092B-C50C-407E-A947-70E740481C1C}">
+                <a14:useLocalDpi xmlns:a14="http://schemas.microsoft.com/office/drawing/2010/main" val="0"/>
+              </a:ext>
+            </a:extLst>
+          </a:blip>
+          <a:srcRect l="11493" t="13720" r="63323" b="57913"/>
+          <a:stretch/>
+        </p:blipFill>
+        <p:spPr>
+          <a:xfrm>
+            <a:off x="3352904" y="503218"/>
+            <a:ext cx="4093954" cy="2594016"/>
+          </a:xfrm>
+          <a:prstGeom prst="rect">
+            <a:avLst/>
+          </a:prstGeom>
+        </p:spPr>
+      </p:pic>
+    </p:spTree>
+    <p:extLst>
+      <p:ext uri="{BB962C8B-B14F-4D97-AF65-F5344CB8AC3E}">
+        <p14:creationId xmlns:p14="http://schemas.microsoft.com/office/powerpoint/2010/main" val="730667668"/>
+      </p:ext>
+    </p:extLst>
+  </p:cSld>
+  <p:clrMapOvr>
+    <a:masterClrMapping/>
+  </p:clrMapOvr>
+</p:sld>
+</file>
+
+<file path=ppt/slides/slide4.xml><?xml version="1.0" encoding="utf-8"?>
+<p:sld xmlns:a="http://schemas.openxmlformats.org/drawingml/2006/main" xmlns:r="http://schemas.openxmlformats.org/officeDocument/2006/relationships" xmlns:p="http://schemas.openxmlformats.org/presentationml/2006/main">
+  <p:cSld>
+    <p:spTree>
+      <p:nvGrpSpPr>
+        <p:cNvPr id="1" name="">
+          <a:extLst>
+            <a:ext uri="{FF2B5EF4-FFF2-40B4-BE49-F238E27FC236}">
+              <a16:creationId xmlns:a16="http://schemas.microsoft.com/office/drawing/2014/main" id="{A9A79EF2-5F7D-E8BC-60B5-8074AC93F777}"/>
+            </a:ext>
+          </a:extLst>
+        </p:cNvPr>
+        <p:cNvGrpSpPr/>
+        <p:nvPr/>
+      </p:nvGrpSpPr>
+      <p:grpSpPr>
+        <a:xfrm>
+          <a:off x="0" y="0"/>
+          <a:ext cx="0" cy="0"/>
+          <a:chOff x="0" y="0"/>
+          <a:chExt cx="0" cy="0"/>
+        </a:xfrm>
+      </p:grpSpPr>
+      <p:pic>
+        <p:nvPicPr>
+          <p:cNvPr id="3" name="图片 2" descr="图示&#10;&#10;描述已自动生成">
+            <a:extLst>
+              <a:ext uri="{FF2B5EF4-FFF2-40B4-BE49-F238E27FC236}">
+                <a16:creationId xmlns:a16="http://schemas.microsoft.com/office/drawing/2014/main" id="{5637EA37-AD9E-A721-53EB-A4056309FCC5}"/>
+              </a:ext>
+            </a:extLst>
+          </p:cNvPr>
+          <p:cNvPicPr>
+            <a:picLocks noChangeAspect="1"/>
+          </p:cNvPicPr>
+          <p:nvPr/>
+        </p:nvPicPr>
+        <p:blipFill>
+          <a:blip r:embed="rId2">
+            <a:extLst>
+              <a:ext uri="{28A0092B-C50C-407E-A947-70E740481C1C}">
+                <a14:useLocalDpi xmlns:a14="http://schemas.microsoft.com/office/drawing/2010/main" val="0"/>
+              </a:ext>
+            </a:extLst>
+          </a:blip>
+          <a:srcRect l="6927" t="50767" r="56111" b="15873"/>
+          <a:stretch/>
+        </p:blipFill>
+        <p:spPr>
+          <a:xfrm>
+            <a:off x="2400714" y="277535"/>
+            <a:ext cx="5998334" cy="3045380"/>
+          </a:xfrm>
+          <a:prstGeom prst="rect">
+            <a:avLst/>
+          </a:prstGeom>
+        </p:spPr>
+      </p:pic>
+    </p:spTree>
+    <p:extLst>
+      <p:ext uri="{BB962C8B-B14F-4D97-AF65-F5344CB8AC3E}">
+        <p14:creationId xmlns:p14="http://schemas.microsoft.com/office/powerpoint/2010/main" val="3862188942"/>
+      </p:ext>
+    </p:extLst>
+  </p:cSld>
+  <p:clrMapOvr>
+    <a:masterClrMapping/>
+  </p:clrMapOvr>
+</p:sld>
+</file>
+
 <file path=ppt/theme/theme1.xml><?xml version="1.0" encoding="utf-8"?>
 <a:theme xmlns:a="http://schemas.openxmlformats.org/drawingml/2006/main" name="Office 主题​​">
   <a:themeElements>
-    <a:clrScheme name="Office">
+    <a:clrScheme name="Office 主题​​">
       <a:dk1>
         <a:sysClr val="windowText" lastClr="000000"/>
       </a:dk1>
@@ -3482,9 +3318,9 @@
         <a:srgbClr val="96607D"/>
       </a:folHlink>
     </a:clrScheme>
-    <a:fontScheme name="Office">
+    <a:fontScheme name="Office 主题​​">
       <a:majorFont>
-        <a:latin typeface="等线 Light" panose="02110004020202020204"/>
+        <a:latin typeface="Aptos Display" panose="02110004020202020204"/>
         <a:ea typeface=""/>
         <a:cs typeface=""/>
         <a:font script="Jpan" typeface="游ゴシック Light"/>
@@ -3536,7 +3372,7 @@
         <a:font script="Tfng" typeface="Ebrima"/>
       </a:majorFont>
       <a:minorFont>
-        <a:latin typeface="等线" panose="02110004020202020204"/>
+        <a:latin typeface="Aptos" panose="02110004020202020204"/>
         <a:ea typeface=""/>
         <a:cs typeface=""/>
         <a:font script="Jpan" typeface="游ゴシック"/>
@@ -3588,7 +3424,7 @@
         <a:font script="Tfng" typeface="Ebrima"/>
       </a:minorFont>
     </a:fontScheme>
-    <a:fmtScheme name="Office">
+    <a:fmtScheme name="Office 主题​​">
       <a:fillStyleLst>
         <a:solidFill>
           <a:schemeClr val="phClr"/>

</xml_diff>